<commit_message>
cluster mit clara, vorstellung des Projektes PowerPoint
</commit_message>
<xml_diff>
--- a/Zwischenpraesentation.pptx
+++ b/Zwischenpraesentation.pptx
@@ -5,21 +5,26 @@
     <p:sldMasterId id="2147483652" r:id="rId1"/>
   </p:sldMasterIdLst>
   <p:notesMasterIdLst>
-    <p:notesMasterId r:id="rId11"/>
+    <p:notesMasterId r:id="rId16"/>
   </p:notesMasterIdLst>
   <p:handoutMasterIdLst>
-    <p:handoutMasterId r:id="rId12"/>
+    <p:handoutMasterId r:id="rId17"/>
   </p:handoutMasterIdLst>
   <p:sldIdLst>
     <p:sldId id="836" r:id="rId2"/>
     <p:sldId id="837" r:id="rId3"/>
-    <p:sldId id="838" r:id="rId4"/>
-    <p:sldId id="839" r:id="rId5"/>
-    <p:sldId id="840" r:id="rId6"/>
-    <p:sldId id="841" r:id="rId7"/>
-    <p:sldId id="842" r:id="rId8"/>
-    <p:sldId id="843" r:id="rId9"/>
-    <p:sldId id="844" r:id="rId10"/>
+    <p:sldId id="846" r:id="rId4"/>
+    <p:sldId id="847" r:id="rId5"/>
+    <p:sldId id="848" r:id="rId6"/>
+    <p:sldId id="849" r:id="rId7"/>
+    <p:sldId id="845" r:id="rId8"/>
+    <p:sldId id="838" r:id="rId9"/>
+    <p:sldId id="839" r:id="rId10"/>
+    <p:sldId id="840" r:id="rId11"/>
+    <p:sldId id="841" r:id="rId12"/>
+    <p:sldId id="842" r:id="rId13"/>
+    <p:sldId id="843" r:id="rId14"/>
+    <p:sldId id="844" r:id="rId15"/>
   </p:sldIdLst>
   <p:sldSz cx="12192000" cy="6858000"/>
   <p:notesSz cx="6781800" cy="9855200"/>
@@ -337,7 +342,7 @@
             <a:fld id="{AE02961B-B228-4466-84E5-B65BB245109F}" type="datetimeFigureOut">
               <a:rPr lang="de-DE"/>
               <a:pPr/>
-              <a:t>08.12.2020</a:t>
+              <a:t>11.12.2020</a:t>
             </a:fld>
             <a:endParaRPr lang="de-DE"/>
           </a:p>
@@ -2278,7 +2283,7 @@
 </p:sld>
 </file>
 
-<file path=ppt/slides/slide2.xml><?xml version="1.0" encoding="utf-8"?>
+<file path=ppt/slides/slide10.xml><?xml version="1.0" encoding="utf-8"?>
 <p:sld xmlns:a="http://schemas.openxmlformats.org/drawingml/2006/main" xmlns:r="http://schemas.openxmlformats.org/officeDocument/2006/relationships" xmlns:p="http://schemas.openxmlformats.org/presentationml/2006/main">
   <p:cSld>
     <p:spTree>
@@ -2320,27 +2325,16 @@
             </a:pPr>
             <a:r>
               <a:rPr lang="de-DE" dirty="0"/>
-              <a:t>Datensatz Reanalyse erklären (8x 20 Messungen, Bereich zeigen auf Weltkarte wo die Messungen sind, </a:t>
+              <a:t>Cluster Versuch mit 320 Dimensionen und </a:t>
             </a:r>
             <a:r>
               <a:rPr lang="de-DE" dirty="0" err="1"/>
-              <a:t>mslp</a:t>
+              <a:t>Mahalanobis</a:t>
             </a:r>
             <a:r>
               <a:rPr lang="de-DE" dirty="0"/>
-              <a:t> und geopotential vorstellen (Wertebereich, Mittelwert etc.), täglich 4 Messungen, deshalb erstmal zusammengefasst zu </a:t>
-            </a:r>
-            <a:r>
-              <a:rPr lang="de-DE" dirty="0" err="1"/>
-              <a:t>avg</a:t>
-            </a:r>
-            <a:endParaRPr lang="de-DE" dirty="0"/>
-          </a:p>
-          <a:p>
-            <a:pPr marL="0" indent="0">
-              <a:buNone/>
-            </a:pPr>
-            <a:endParaRPr lang="de-DE" dirty="0"/>
+              <a:t> Distanz</a:t>
+            </a:r>
           </a:p>
         </p:txBody>
       </p:sp>
@@ -2367,7 +2361,7 @@
               <a:pPr>
                 <a:defRPr/>
               </a:pPr>
-              <a:t>2</a:t>
+              <a:t>10</a:t>
             </a:fld>
             <a:endParaRPr lang="de-DE" dirty="0"/>
           </a:p>
@@ -2568,6 +2562,1684 @@
               </a:rPr>
               <a:t>Statistisches Praktikum</a:t>
             </a:r>
+          </a:p>
+        </p:txBody>
+      </p:sp>
+    </p:spTree>
+    <p:extLst>
+      <p:ext uri="{BB962C8B-B14F-4D97-AF65-F5344CB8AC3E}">
+        <p14:creationId xmlns:p14="http://schemas.microsoft.com/office/powerpoint/2010/main" val="525843294"/>
+      </p:ext>
+    </p:extLst>
+  </p:cSld>
+  <p:clrMapOvr>
+    <a:masterClrMapping/>
+  </p:clrMapOvr>
+  <p:transition spd="med"/>
+</p:sld>
+</file>
+
+<file path=ppt/slides/slide11.xml><?xml version="1.0" encoding="utf-8"?>
+<p:sld xmlns:a="http://schemas.openxmlformats.org/drawingml/2006/main" xmlns:r="http://schemas.openxmlformats.org/officeDocument/2006/relationships" xmlns:p="http://schemas.openxmlformats.org/presentationml/2006/main">
+  <p:cSld>
+    <p:spTree>
+      <p:nvGrpSpPr>
+        <p:cNvPr id="1" name=""/>
+        <p:cNvGrpSpPr/>
+        <p:nvPr/>
+      </p:nvGrpSpPr>
+      <p:grpSpPr>
+        <a:xfrm>
+          <a:off x="0" y="0"/>
+          <a:ext cx="0" cy="0"/>
+          <a:chOff x="0" y="0"/>
+          <a:chExt cx="0" cy="0"/>
+        </a:xfrm>
+      </p:grpSpPr>
+      <p:sp>
+        <p:nvSpPr>
+          <p:cNvPr id="3" name="Inhaltsplatzhalter 2"/>
+          <p:cNvSpPr>
+            <a:spLocks noGrp="1"/>
+          </p:cNvSpPr>
+          <p:nvPr>
+            <p:ph idx="1"/>
+          </p:nvPr>
+        </p:nvSpPr>
+        <p:spPr>
+          <a:xfrm>
+            <a:off x="302605" y="1347759"/>
+            <a:ext cx="11554963" cy="1505177"/>
+          </a:xfrm>
+        </p:spPr>
+        <p:txBody>
+          <a:bodyPr/>
+          <a:lstStyle/>
+          <a:p>
+            <a:pPr marL="0" indent="0">
+              <a:buNone/>
+            </a:pPr>
+            <a:r>
+              <a:rPr lang="de-DE" dirty="0"/>
+              <a:t>PCA Versuch: </a:t>
+            </a:r>
+            <a:r>
+              <a:rPr lang="de-DE" dirty="0" err="1"/>
+              <a:t>elbow</a:t>
+            </a:r>
+            <a:r>
+              <a:rPr lang="de-DE" dirty="0"/>
+              <a:t> Plot, generell erklären, </a:t>
+            </a:r>
+            <a:r>
+              <a:rPr lang="de-DE" dirty="0" err="1"/>
+              <a:t>cluster</a:t>
+            </a:r>
+            <a:r>
+              <a:rPr lang="de-DE" dirty="0"/>
+              <a:t> zeigen, Mosaikplot</a:t>
+            </a:r>
+          </a:p>
+        </p:txBody>
+      </p:sp>
+      <p:sp>
+        <p:nvSpPr>
+          <p:cNvPr id="4" name="Foliennummernplatzhalter 3"/>
+          <p:cNvSpPr>
+            <a:spLocks noGrp="1"/>
+          </p:cNvSpPr>
+          <p:nvPr>
+            <p:ph type="sldNum" sz="quarter" idx="4"/>
+          </p:nvPr>
+        </p:nvSpPr>
+        <p:spPr/>
+        <p:txBody>
+          <a:bodyPr/>
+          <a:lstStyle/>
+          <a:p>
+            <a:pPr>
+              <a:defRPr/>
+            </a:pPr>
+            <a:fld id="{70BFFA52-4234-45F6-B1A6-074E24FF43A2}" type="slidenum">
+              <a:rPr lang="de-DE" smtClean="0"/>
+              <a:pPr>
+                <a:defRPr/>
+              </a:pPr>
+              <a:t>11</a:t>
+            </a:fld>
+            <a:endParaRPr lang="de-DE" dirty="0"/>
+          </a:p>
+        </p:txBody>
+      </p:sp>
+      <p:sp>
+        <p:nvSpPr>
+          <p:cNvPr id="5" name="Fußzeilenplatzhalter 4"/>
+          <p:cNvSpPr>
+            <a:spLocks noGrp="1"/>
+          </p:cNvSpPr>
+          <p:nvPr>
+            <p:ph type="ftr" sz="quarter" idx="3"/>
+          </p:nvPr>
+        </p:nvSpPr>
+        <p:spPr>
+          <a:solidFill>
+            <a:srgbClr val="C6C7BE"/>
+          </a:solidFill>
+        </p:spPr>
+        <p:txBody>
+          <a:bodyPr/>
+          <a:lstStyle/>
+          <a:p>
+            <a:r>
+              <a:rPr lang="de-DE" dirty="0"/>
+              <a:t>Zwischenpräsentation am 21.12.2020</a:t>
+            </a:r>
+          </a:p>
+        </p:txBody>
+      </p:sp>
+      <p:sp>
+        <p:nvSpPr>
+          <p:cNvPr id="7" name="Rechteck 6">
+            <a:extLst>
+              <a:ext uri="{FF2B5EF4-FFF2-40B4-BE49-F238E27FC236}">
+                <a16:creationId xmlns:a16="http://schemas.microsoft.com/office/drawing/2014/main" id="{29390B17-4145-41B9-82BB-F790CBEBDE6D}"/>
+              </a:ext>
+            </a:extLst>
+          </p:cNvPr>
+          <p:cNvSpPr/>
+          <p:nvPr/>
+        </p:nvSpPr>
+        <p:spPr bwMode="auto">
+          <a:xfrm>
+            <a:off x="9300356" y="188640"/>
+            <a:ext cx="1800200" cy="792088"/>
+          </a:xfrm>
+          <a:prstGeom prst="rect">
+            <a:avLst/>
+          </a:prstGeom>
+          <a:solidFill>
+            <a:srgbClr val="C6C7BE"/>
+          </a:solidFill>
+          <a:ln w="12700" cap="flat" cmpd="sng" algn="ctr">
+            <a:solidFill>
+              <a:srgbClr val="C6C7BE"/>
+            </a:solidFill>
+            <a:prstDash val="solid"/>
+            <a:round/>
+            <a:headEnd type="none" w="med" len="med"/>
+            <a:tailEnd type="none" w="med" len="med"/>
+          </a:ln>
+          <a:effectLst/>
+        </p:spPr>
+        <p:txBody>
+          <a:bodyPr vert="horz" wrap="square" lIns="91440" tIns="45720" rIns="91440" bIns="45720" numCol="1" rtlCol="0" anchor="ctr" anchorCtr="0" compatLnSpc="1">
+            <a:prstTxWarp prst="textNoShape">
+              <a:avLst/>
+            </a:prstTxWarp>
+          </a:bodyPr>
+          <a:lstStyle/>
+          <a:p>
+            <a:pPr marL="0" marR="0" indent="0" algn="l" defTabSz="914400" rtl="0" eaLnBrk="0" fontAlgn="base" latinLnBrk="0" hangingPunct="0">
+              <a:lnSpc>
+                <a:spcPct val="100000"/>
+              </a:lnSpc>
+              <a:spcBef>
+                <a:spcPct val="0"/>
+              </a:spcBef>
+              <a:spcAft>
+                <a:spcPct val="0"/>
+              </a:spcAft>
+              <a:buClrTx/>
+              <a:buSzTx/>
+              <a:buFontTx/>
+              <a:buNone/>
+              <a:tabLst/>
+            </a:pPr>
+            <a:endParaRPr kumimoji="0" lang="de-DE" sz="1400" b="0" i="0" u="none" strike="noStrike" cap="none" normalizeH="0" baseline="0" dirty="0">
+              <a:ln>
+                <a:noFill/>
+              </a:ln>
+              <a:solidFill>
+                <a:schemeClr val="tx1"/>
+              </a:solidFill>
+              <a:effectLst/>
+              <a:latin typeface="LMU CompatilFact" pitchFamily="2" charset="0"/>
+            </a:endParaRPr>
+          </a:p>
+        </p:txBody>
+      </p:sp>
+      <p:sp>
+        <p:nvSpPr>
+          <p:cNvPr id="8" name="Textplatzhalter 10">
+            <a:extLst>
+              <a:ext uri="{FF2B5EF4-FFF2-40B4-BE49-F238E27FC236}">
+                <a16:creationId xmlns:a16="http://schemas.microsoft.com/office/drawing/2014/main" id="{684298D9-AF3C-4E36-981C-BC14C51ED7F3}"/>
+              </a:ext>
+            </a:extLst>
+          </p:cNvPr>
+          <p:cNvSpPr>
+            <a:spLocks noGrp="1"/>
+          </p:cNvSpPr>
+          <p:nvPr>
+            <p:ph type="title"/>
+          </p:nvPr>
+        </p:nvSpPr>
+        <p:spPr>
+          <a:xfrm>
+            <a:off x="2207568" y="620713"/>
+            <a:ext cx="6768752" cy="457200"/>
+          </a:xfrm>
+        </p:spPr>
+        <p:txBody>
+          <a:bodyPr/>
+          <a:lstStyle/>
+          <a:p>
+            <a:r>
+              <a:rPr lang="de-DE" b="0" dirty="0"/>
+              <a:t>Katja </a:t>
+            </a:r>
+            <a:r>
+              <a:rPr lang="de-DE" b="0" dirty="0" err="1"/>
+              <a:t>Gutmair</a:t>
+            </a:r>
+            <a:r>
+              <a:rPr lang="de-DE" b="0" dirty="0"/>
+              <a:t>, Stella </a:t>
+            </a:r>
+            <a:r>
+              <a:rPr lang="de-DE" b="0" dirty="0" err="1"/>
+              <a:t>Akouete</a:t>
+            </a:r>
+            <a:r>
+              <a:rPr lang="de-DE" b="0" dirty="0"/>
+              <a:t>, Noah </a:t>
+            </a:r>
+            <a:r>
+              <a:rPr lang="de-DE" b="0" dirty="0" err="1"/>
+              <a:t>Hurmer</a:t>
+            </a:r>
+            <a:r>
+              <a:rPr lang="de-DE" b="0" dirty="0"/>
+              <a:t> und Anne </a:t>
+            </a:r>
+            <a:r>
+              <a:rPr lang="de-DE" b="0" dirty="0" err="1"/>
+              <a:t>Gritto</a:t>
+            </a:r>
+            <a:endParaRPr lang="de-DE" b="0" dirty="0"/>
+          </a:p>
+        </p:txBody>
+      </p:sp>
+      <p:sp>
+        <p:nvSpPr>
+          <p:cNvPr id="9" name="Textfeld 8">
+            <a:extLst>
+              <a:ext uri="{FF2B5EF4-FFF2-40B4-BE49-F238E27FC236}">
+                <a16:creationId xmlns:a16="http://schemas.microsoft.com/office/drawing/2014/main" id="{9384E611-4063-43BC-B19B-9DDAB886DBCE}"/>
+              </a:ext>
+            </a:extLst>
+          </p:cNvPr>
+          <p:cNvSpPr txBox="1"/>
+          <p:nvPr/>
+        </p:nvSpPr>
+        <p:spPr>
+          <a:xfrm>
+            <a:off x="9272180" y="658682"/>
+            <a:ext cx="2585388" cy="400110"/>
+          </a:xfrm>
+          <a:prstGeom prst="rect">
+            <a:avLst/>
+          </a:prstGeom>
+          <a:noFill/>
+        </p:spPr>
+        <p:txBody>
+          <a:bodyPr wrap="none" rtlCol="0">
+            <a:spAutoFit/>
+          </a:bodyPr>
+          <a:lstStyle/>
+          <a:p>
+            <a:r>
+              <a:rPr lang="de-DE" sz="2000" dirty="0">
+                <a:solidFill>
+                  <a:srgbClr val="006C30"/>
+                </a:solidFill>
+              </a:rPr>
+              <a:t>Statistisches Praktikum</a:t>
+            </a:r>
+          </a:p>
+        </p:txBody>
+      </p:sp>
+    </p:spTree>
+    <p:extLst>
+      <p:ext uri="{BB962C8B-B14F-4D97-AF65-F5344CB8AC3E}">
+        <p14:creationId xmlns:p14="http://schemas.microsoft.com/office/powerpoint/2010/main" val="91214873"/>
+      </p:ext>
+    </p:extLst>
+  </p:cSld>
+  <p:clrMapOvr>
+    <a:masterClrMapping/>
+  </p:clrMapOvr>
+  <p:transition spd="med"/>
+</p:sld>
+</file>
+
+<file path=ppt/slides/slide12.xml><?xml version="1.0" encoding="utf-8"?>
+<p:sld xmlns:a="http://schemas.openxmlformats.org/drawingml/2006/main" xmlns:r="http://schemas.openxmlformats.org/officeDocument/2006/relationships" xmlns:p="http://schemas.openxmlformats.org/presentationml/2006/main">
+  <p:cSld>
+    <p:spTree>
+      <p:nvGrpSpPr>
+        <p:cNvPr id="1" name=""/>
+        <p:cNvGrpSpPr/>
+        <p:nvPr/>
+      </p:nvGrpSpPr>
+      <p:grpSpPr>
+        <a:xfrm>
+          <a:off x="0" y="0"/>
+          <a:ext cx="0" cy="0"/>
+          <a:chOff x="0" y="0"/>
+          <a:chExt cx="0" cy="0"/>
+        </a:xfrm>
+      </p:grpSpPr>
+      <p:sp>
+        <p:nvSpPr>
+          <p:cNvPr id="3" name="Inhaltsplatzhalter 2"/>
+          <p:cNvSpPr>
+            <a:spLocks noGrp="1"/>
+          </p:cNvSpPr>
+          <p:nvPr>
+            <p:ph idx="1"/>
+          </p:nvPr>
+        </p:nvSpPr>
+        <p:spPr>
+          <a:xfrm>
+            <a:off x="302605" y="1347759"/>
+            <a:ext cx="11554963" cy="1505177"/>
+          </a:xfrm>
+        </p:spPr>
+        <p:txBody>
+          <a:bodyPr/>
+          <a:lstStyle/>
+          <a:p>
+            <a:pPr marL="0" indent="0">
+              <a:buNone/>
+            </a:pPr>
+            <a:r>
+              <a:rPr lang="de-DE" dirty="0"/>
+              <a:t>Datensatz filtern: wie das gemacht wurde </a:t>
+            </a:r>
+            <a:r>
+              <a:rPr lang="de-DE" dirty="0" err="1"/>
+              <a:t>bzw</a:t>
+            </a:r>
+            <a:r>
+              <a:rPr lang="de-DE" dirty="0"/>
+              <a:t> welche Variablen über bleiben und Clusterversuch, </a:t>
+            </a:r>
+            <a:r>
+              <a:rPr lang="de-DE" dirty="0" err="1"/>
+              <a:t>evtl</a:t>
+            </a:r>
+            <a:r>
+              <a:rPr lang="de-DE" dirty="0"/>
+              <a:t> auch Mosaikplot</a:t>
+            </a:r>
+          </a:p>
+        </p:txBody>
+      </p:sp>
+      <p:sp>
+        <p:nvSpPr>
+          <p:cNvPr id="4" name="Foliennummernplatzhalter 3"/>
+          <p:cNvSpPr>
+            <a:spLocks noGrp="1"/>
+          </p:cNvSpPr>
+          <p:nvPr>
+            <p:ph type="sldNum" sz="quarter" idx="4"/>
+          </p:nvPr>
+        </p:nvSpPr>
+        <p:spPr/>
+        <p:txBody>
+          <a:bodyPr/>
+          <a:lstStyle/>
+          <a:p>
+            <a:pPr>
+              <a:defRPr/>
+            </a:pPr>
+            <a:fld id="{70BFFA52-4234-45F6-B1A6-074E24FF43A2}" type="slidenum">
+              <a:rPr lang="de-DE" smtClean="0"/>
+              <a:pPr>
+                <a:defRPr/>
+              </a:pPr>
+              <a:t>12</a:t>
+            </a:fld>
+            <a:endParaRPr lang="de-DE" dirty="0"/>
+          </a:p>
+        </p:txBody>
+      </p:sp>
+      <p:sp>
+        <p:nvSpPr>
+          <p:cNvPr id="5" name="Fußzeilenplatzhalter 4"/>
+          <p:cNvSpPr>
+            <a:spLocks noGrp="1"/>
+          </p:cNvSpPr>
+          <p:nvPr>
+            <p:ph type="ftr" sz="quarter" idx="3"/>
+          </p:nvPr>
+        </p:nvSpPr>
+        <p:spPr>
+          <a:solidFill>
+            <a:srgbClr val="C6C7BE"/>
+          </a:solidFill>
+        </p:spPr>
+        <p:txBody>
+          <a:bodyPr/>
+          <a:lstStyle/>
+          <a:p>
+            <a:r>
+              <a:rPr lang="de-DE" dirty="0"/>
+              <a:t>Zwischenpräsentation am 21.12.2020</a:t>
+            </a:r>
+          </a:p>
+        </p:txBody>
+      </p:sp>
+      <p:sp>
+        <p:nvSpPr>
+          <p:cNvPr id="7" name="Rechteck 6">
+            <a:extLst>
+              <a:ext uri="{FF2B5EF4-FFF2-40B4-BE49-F238E27FC236}">
+                <a16:creationId xmlns:a16="http://schemas.microsoft.com/office/drawing/2014/main" id="{29390B17-4145-41B9-82BB-F790CBEBDE6D}"/>
+              </a:ext>
+            </a:extLst>
+          </p:cNvPr>
+          <p:cNvSpPr/>
+          <p:nvPr/>
+        </p:nvSpPr>
+        <p:spPr bwMode="auto">
+          <a:xfrm>
+            <a:off x="9300356" y="188640"/>
+            <a:ext cx="1800200" cy="792088"/>
+          </a:xfrm>
+          <a:prstGeom prst="rect">
+            <a:avLst/>
+          </a:prstGeom>
+          <a:solidFill>
+            <a:srgbClr val="C6C7BE"/>
+          </a:solidFill>
+          <a:ln w="12700" cap="flat" cmpd="sng" algn="ctr">
+            <a:solidFill>
+              <a:srgbClr val="C6C7BE"/>
+            </a:solidFill>
+            <a:prstDash val="solid"/>
+            <a:round/>
+            <a:headEnd type="none" w="med" len="med"/>
+            <a:tailEnd type="none" w="med" len="med"/>
+          </a:ln>
+          <a:effectLst/>
+        </p:spPr>
+        <p:txBody>
+          <a:bodyPr vert="horz" wrap="square" lIns="91440" tIns="45720" rIns="91440" bIns="45720" numCol="1" rtlCol="0" anchor="ctr" anchorCtr="0" compatLnSpc="1">
+            <a:prstTxWarp prst="textNoShape">
+              <a:avLst/>
+            </a:prstTxWarp>
+          </a:bodyPr>
+          <a:lstStyle/>
+          <a:p>
+            <a:pPr marL="0" marR="0" indent="0" algn="l" defTabSz="914400" rtl="0" eaLnBrk="0" fontAlgn="base" latinLnBrk="0" hangingPunct="0">
+              <a:lnSpc>
+                <a:spcPct val="100000"/>
+              </a:lnSpc>
+              <a:spcBef>
+                <a:spcPct val="0"/>
+              </a:spcBef>
+              <a:spcAft>
+                <a:spcPct val="0"/>
+              </a:spcAft>
+              <a:buClrTx/>
+              <a:buSzTx/>
+              <a:buFontTx/>
+              <a:buNone/>
+              <a:tabLst/>
+            </a:pPr>
+            <a:endParaRPr kumimoji="0" lang="de-DE" sz="1400" b="0" i="0" u="none" strike="noStrike" cap="none" normalizeH="0" baseline="0" dirty="0">
+              <a:ln>
+                <a:noFill/>
+              </a:ln>
+              <a:solidFill>
+                <a:schemeClr val="tx1"/>
+              </a:solidFill>
+              <a:effectLst/>
+              <a:latin typeface="LMU CompatilFact" pitchFamily="2" charset="0"/>
+            </a:endParaRPr>
+          </a:p>
+        </p:txBody>
+      </p:sp>
+      <p:sp>
+        <p:nvSpPr>
+          <p:cNvPr id="8" name="Textplatzhalter 10">
+            <a:extLst>
+              <a:ext uri="{FF2B5EF4-FFF2-40B4-BE49-F238E27FC236}">
+                <a16:creationId xmlns:a16="http://schemas.microsoft.com/office/drawing/2014/main" id="{684298D9-AF3C-4E36-981C-BC14C51ED7F3}"/>
+              </a:ext>
+            </a:extLst>
+          </p:cNvPr>
+          <p:cNvSpPr>
+            <a:spLocks noGrp="1"/>
+          </p:cNvSpPr>
+          <p:nvPr>
+            <p:ph type="title"/>
+          </p:nvPr>
+        </p:nvSpPr>
+        <p:spPr>
+          <a:xfrm>
+            <a:off x="2207568" y="620713"/>
+            <a:ext cx="6768752" cy="457200"/>
+          </a:xfrm>
+        </p:spPr>
+        <p:txBody>
+          <a:bodyPr/>
+          <a:lstStyle/>
+          <a:p>
+            <a:r>
+              <a:rPr lang="de-DE" b="0" dirty="0"/>
+              <a:t>Katja </a:t>
+            </a:r>
+            <a:r>
+              <a:rPr lang="de-DE" b="0" dirty="0" err="1"/>
+              <a:t>Gutmair</a:t>
+            </a:r>
+            <a:r>
+              <a:rPr lang="de-DE" b="0" dirty="0"/>
+              <a:t>, Stella </a:t>
+            </a:r>
+            <a:r>
+              <a:rPr lang="de-DE" b="0" dirty="0" err="1"/>
+              <a:t>Akouete</a:t>
+            </a:r>
+            <a:r>
+              <a:rPr lang="de-DE" b="0" dirty="0"/>
+              <a:t>, Noah </a:t>
+            </a:r>
+            <a:r>
+              <a:rPr lang="de-DE" b="0" dirty="0" err="1"/>
+              <a:t>Hurmer</a:t>
+            </a:r>
+            <a:r>
+              <a:rPr lang="de-DE" b="0" dirty="0"/>
+              <a:t> und Anne </a:t>
+            </a:r>
+            <a:r>
+              <a:rPr lang="de-DE" b="0" dirty="0" err="1"/>
+              <a:t>Gritto</a:t>
+            </a:r>
+            <a:endParaRPr lang="de-DE" b="0" dirty="0"/>
+          </a:p>
+        </p:txBody>
+      </p:sp>
+      <p:sp>
+        <p:nvSpPr>
+          <p:cNvPr id="9" name="Textfeld 8">
+            <a:extLst>
+              <a:ext uri="{FF2B5EF4-FFF2-40B4-BE49-F238E27FC236}">
+                <a16:creationId xmlns:a16="http://schemas.microsoft.com/office/drawing/2014/main" id="{9384E611-4063-43BC-B19B-9DDAB886DBCE}"/>
+              </a:ext>
+            </a:extLst>
+          </p:cNvPr>
+          <p:cNvSpPr txBox="1"/>
+          <p:nvPr/>
+        </p:nvSpPr>
+        <p:spPr>
+          <a:xfrm>
+            <a:off x="9272180" y="658682"/>
+            <a:ext cx="2585388" cy="400110"/>
+          </a:xfrm>
+          <a:prstGeom prst="rect">
+            <a:avLst/>
+          </a:prstGeom>
+          <a:noFill/>
+        </p:spPr>
+        <p:txBody>
+          <a:bodyPr wrap="none" rtlCol="0">
+            <a:spAutoFit/>
+          </a:bodyPr>
+          <a:lstStyle/>
+          <a:p>
+            <a:r>
+              <a:rPr lang="de-DE" sz="2000" dirty="0">
+                <a:solidFill>
+                  <a:srgbClr val="006C30"/>
+                </a:solidFill>
+              </a:rPr>
+              <a:t>Statistisches Praktikum</a:t>
+            </a:r>
+          </a:p>
+        </p:txBody>
+      </p:sp>
+    </p:spTree>
+    <p:extLst>
+      <p:ext uri="{BB962C8B-B14F-4D97-AF65-F5344CB8AC3E}">
+        <p14:creationId xmlns:p14="http://schemas.microsoft.com/office/powerpoint/2010/main" val="2394635770"/>
+      </p:ext>
+    </p:extLst>
+  </p:cSld>
+  <p:clrMapOvr>
+    <a:masterClrMapping/>
+  </p:clrMapOvr>
+  <p:transition spd="med"/>
+</p:sld>
+</file>
+
+<file path=ppt/slides/slide13.xml><?xml version="1.0" encoding="utf-8"?>
+<p:sld xmlns:a="http://schemas.openxmlformats.org/drawingml/2006/main" xmlns:r="http://schemas.openxmlformats.org/officeDocument/2006/relationships" xmlns:p="http://schemas.openxmlformats.org/presentationml/2006/main">
+  <p:cSld>
+    <p:spTree>
+      <p:nvGrpSpPr>
+        <p:cNvPr id="1" name=""/>
+        <p:cNvGrpSpPr/>
+        <p:nvPr/>
+      </p:nvGrpSpPr>
+      <p:grpSpPr>
+        <a:xfrm>
+          <a:off x="0" y="0"/>
+          <a:ext cx="0" cy="0"/>
+          <a:chOff x="0" y="0"/>
+          <a:chExt cx="0" cy="0"/>
+        </a:xfrm>
+      </p:grpSpPr>
+      <p:sp>
+        <p:nvSpPr>
+          <p:cNvPr id="3" name="Inhaltsplatzhalter 2"/>
+          <p:cNvSpPr>
+            <a:spLocks noGrp="1"/>
+          </p:cNvSpPr>
+          <p:nvPr>
+            <p:ph idx="1"/>
+          </p:nvPr>
+        </p:nvSpPr>
+        <p:spPr>
+          <a:xfrm>
+            <a:off x="302605" y="1347759"/>
+            <a:ext cx="11554963" cy="1505177"/>
+          </a:xfrm>
+        </p:spPr>
+        <p:txBody>
+          <a:bodyPr/>
+          <a:lstStyle/>
+          <a:p>
+            <a:pPr marL="0" indent="0">
+              <a:buNone/>
+            </a:pPr>
+            <a:r>
+              <a:rPr lang="de-DE" dirty="0"/>
+              <a:t>Etc.</a:t>
+            </a:r>
+          </a:p>
+        </p:txBody>
+      </p:sp>
+      <p:sp>
+        <p:nvSpPr>
+          <p:cNvPr id="4" name="Foliennummernplatzhalter 3"/>
+          <p:cNvSpPr>
+            <a:spLocks noGrp="1"/>
+          </p:cNvSpPr>
+          <p:nvPr>
+            <p:ph type="sldNum" sz="quarter" idx="4"/>
+          </p:nvPr>
+        </p:nvSpPr>
+        <p:spPr/>
+        <p:txBody>
+          <a:bodyPr/>
+          <a:lstStyle/>
+          <a:p>
+            <a:pPr>
+              <a:defRPr/>
+            </a:pPr>
+            <a:fld id="{70BFFA52-4234-45F6-B1A6-074E24FF43A2}" type="slidenum">
+              <a:rPr lang="de-DE" smtClean="0"/>
+              <a:pPr>
+                <a:defRPr/>
+              </a:pPr>
+              <a:t>13</a:t>
+            </a:fld>
+            <a:endParaRPr lang="de-DE" dirty="0"/>
+          </a:p>
+        </p:txBody>
+      </p:sp>
+      <p:sp>
+        <p:nvSpPr>
+          <p:cNvPr id="5" name="Fußzeilenplatzhalter 4"/>
+          <p:cNvSpPr>
+            <a:spLocks noGrp="1"/>
+          </p:cNvSpPr>
+          <p:nvPr>
+            <p:ph type="ftr" sz="quarter" idx="3"/>
+          </p:nvPr>
+        </p:nvSpPr>
+        <p:spPr>
+          <a:solidFill>
+            <a:srgbClr val="C6C7BE"/>
+          </a:solidFill>
+        </p:spPr>
+        <p:txBody>
+          <a:bodyPr/>
+          <a:lstStyle/>
+          <a:p>
+            <a:r>
+              <a:rPr lang="de-DE" dirty="0"/>
+              <a:t>Zwischenpräsentation am 21.12.2020</a:t>
+            </a:r>
+          </a:p>
+        </p:txBody>
+      </p:sp>
+      <p:sp>
+        <p:nvSpPr>
+          <p:cNvPr id="7" name="Rechteck 6">
+            <a:extLst>
+              <a:ext uri="{FF2B5EF4-FFF2-40B4-BE49-F238E27FC236}">
+                <a16:creationId xmlns:a16="http://schemas.microsoft.com/office/drawing/2014/main" id="{29390B17-4145-41B9-82BB-F790CBEBDE6D}"/>
+              </a:ext>
+            </a:extLst>
+          </p:cNvPr>
+          <p:cNvSpPr/>
+          <p:nvPr/>
+        </p:nvSpPr>
+        <p:spPr bwMode="auto">
+          <a:xfrm>
+            <a:off x="9300356" y="188640"/>
+            <a:ext cx="1800200" cy="792088"/>
+          </a:xfrm>
+          <a:prstGeom prst="rect">
+            <a:avLst/>
+          </a:prstGeom>
+          <a:solidFill>
+            <a:srgbClr val="C6C7BE"/>
+          </a:solidFill>
+          <a:ln w="12700" cap="flat" cmpd="sng" algn="ctr">
+            <a:solidFill>
+              <a:srgbClr val="C6C7BE"/>
+            </a:solidFill>
+            <a:prstDash val="solid"/>
+            <a:round/>
+            <a:headEnd type="none" w="med" len="med"/>
+            <a:tailEnd type="none" w="med" len="med"/>
+          </a:ln>
+          <a:effectLst/>
+        </p:spPr>
+        <p:txBody>
+          <a:bodyPr vert="horz" wrap="square" lIns="91440" tIns="45720" rIns="91440" bIns="45720" numCol="1" rtlCol="0" anchor="ctr" anchorCtr="0" compatLnSpc="1">
+            <a:prstTxWarp prst="textNoShape">
+              <a:avLst/>
+            </a:prstTxWarp>
+          </a:bodyPr>
+          <a:lstStyle/>
+          <a:p>
+            <a:pPr marL="0" marR="0" indent="0" algn="l" defTabSz="914400" rtl="0" eaLnBrk="0" fontAlgn="base" latinLnBrk="0" hangingPunct="0">
+              <a:lnSpc>
+                <a:spcPct val="100000"/>
+              </a:lnSpc>
+              <a:spcBef>
+                <a:spcPct val="0"/>
+              </a:spcBef>
+              <a:spcAft>
+                <a:spcPct val="0"/>
+              </a:spcAft>
+              <a:buClrTx/>
+              <a:buSzTx/>
+              <a:buFontTx/>
+              <a:buNone/>
+              <a:tabLst/>
+            </a:pPr>
+            <a:endParaRPr kumimoji="0" lang="de-DE" sz="1400" b="0" i="0" u="none" strike="noStrike" cap="none" normalizeH="0" baseline="0" dirty="0">
+              <a:ln>
+                <a:noFill/>
+              </a:ln>
+              <a:solidFill>
+                <a:schemeClr val="tx1"/>
+              </a:solidFill>
+              <a:effectLst/>
+              <a:latin typeface="LMU CompatilFact" pitchFamily="2" charset="0"/>
+            </a:endParaRPr>
+          </a:p>
+        </p:txBody>
+      </p:sp>
+      <p:sp>
+        <p:nvSpPr>
+          <p:cNvPr id="8" name="Textplatzhalter 10">
+            <a:extLst>
+              <a:ext uri="{FF2B5EF4-FFF2-40B4-BE49-F238E27FC236}">
+                <a16:creationId xmlns:a16="http://schemas.microsoft.com/office/drawing/2014/main" id="{684298D9-AF3C-4E36-981C-BC14C51ED7F3}"/>
+              </a:ext>
+            </a:extLst>
+          </p:cNvPr>
+          <p:cNvSpPr>
+            <a:spLocks noGrp="1"/>
+          </p:cNvSpPr>
+          <p:nvPr>
+            <p:ph type="title"/>
+          </p:nvPr>
+        </p:nvSpPr>
+        <p:spPr>
+          <a:xfrm>
+            <a:off x="2207568" y="620713"/>
+            <a:ext cx="6768752" cy="457200"/>
+          </a:xfrm>
+        </p:spPr>
+        <p:txBody>
+          <a:bodyPr/>
+          <a:lstStyle/>
+          <a:p>
+            <a:r>
+              <a:rPr lang="de-DE" b="0" dirty="0"/>
+              <a:t>Katja </a:t>
+            </a:r>
+            <a:r>
+              <a:rPr lang="de-DE" b="0" dirty="0" err="1"/>
+              <a:t>Gutmair</a:t>
+            </a:r>
+            <a:r>
+              <a:rPr lang="de-DE" b="0" dirty="0"/>
+              <a:t>, Stella </a:t>
+            </a:r>
+            <a:r>
+              <a:rPr lang="de-DE" b="0" dirty="0" err="1"/>
+              <a:t>Akouete</a:t>
+            </a:r>
+            <a:r>
+              <a:rPr lang="de-DE" b="0" dirty="0"/>
+              <a:t>, Noah </a:t>
+            </a:r>
+            <a:r>
+              <a:rPr lang="de-DE" b="0" dirty="0" err="1"/>
+              <a:t>Hurmer</a:t>
+            </a:r>
+            <a:r>
+              <a:rPr lang="de-DE" b="0" dirty="0"/>
+              <a:t> und Anne </a:t>
+            </a:r>
+            <a:r>
+              <a:rPr lang="de-DE" b="0" dirty="0" err="1"/>
+              <a:t>Gritto</a:t>
+            </a:r>
+            <a:endParaRPr lang="de-DE" b="0" dirty="0"/>
+          </a:p>
+        </p:txBody>
+      </p:sp>
+      <p:sp>
+        <p:nvSpPr>
+          <p:cNvPr id="9" name="Textfeld 8">
+            <a:extLst>
+              <a:ext uri="{FF2B5EF4-FFF2-40B4-BE49-F238E27FC236}">
+                <a16:creationId xmlns:a16="http://schemas.microsoft.com/office/drawing/2014/main" id="{9384E611-4063-43BC-B19B-9DDAB886DBCE}"/>
+              </a:ext>
+            </a:extLst>
+          </p:cNvPr>
+          <p:cNvSpPr txBox="1"/>
+          <p:nvPr/>
+        </p:nvSpPr>
+        <p:spPr>
+          <a:xfrm>
+            <a:off x="9272180" y="658682"/>
+            <a:ext cx="2585388" cy="400110"/>
+          </a:xfrm>
+          <a:prstGeom prst="rect">
+            <a:avLst/>
+          </a:prstGeom>
+          <a:noFill/>
+        </p:spPr>
+        <p:txBody>
+          <a:bodyPr wrap="none" rtlCol="0">
+            <a:spAutoFit/>
+          </a:bodyPr>
+          <a:lstStyle/>
+          <a:p>
+            <a:r>
+              <a:rPr lang="de-DE" sz="2000" dirty="0">
+                <a:solidFill>
+                  <a:srgbClr val="006C30"/>
+                </a:solidFill>
+              </a:rPr>
+              <a:t>Statistisches Praktikum</a:t>
+            </a:r>
+          </a:p>
+        </p:txBody>
+      </p:sp>
+    </p:spTree>
+    <p:extLst>
+      <p:ext uri="{BB962C8B-B14F-4D97-AF65-F5344CB8AC3E}">
+        <p14:creationId xmlns:p14="http://schemas.microsoft.com/office/powerpoint/2010/main" val="3258005233"/>
+      </p:ext>
+    </p:extLst>
+  </p:cSld>
+  <p:clrMapOvr>
+    <a:masterClrMapping/>
+  </p:clrMapOvr>
+  <p:transition spd="med"/>
+</p:sld>
+</file>
+
+<file path=ppt/slides/slide14.xml><?xml version="1.0" encoding="utf-8"?>
+<p:sld xmlns:a="http://schemas.openxmlformats.org/drawingml/2006/main" xmlns:r="http://schemas.openxmlformats.org/officeDocument/2006/relationships" xmlns:p="http://schemas.openxmlformats.org/presentationml/2006/main">
+  <p:cSld>
+    <p:spTree>
+      <p:nvGrpSpPr>
+        <p:cNvPr id="1" name=""/>
+        <p:cNvGrpSpPr/>
+        <p:nvPr/>
+      </p:nvGrpSpPr>
+      <p:grpSpPr>
+        <a:xfrm>
+          <a:off x="0" y="0"/>
+          <a:ext cx="0" cy="0"/>
+          <a:chOff x="0" y="0"/>
+          <a:chExt cx="0" cy="0"/>
+        </a:xfrm>
+      </p:grpSpPr>
+      <p:sp>
+        <p:nvSpPr>
+          <p:cNvPr id="3" name="Inhaltsplatzhalter 2"/>
+          <p:cNvSpPr>
+            <a:spLocks noGrp="1"/>
+          </p:cNvSpPr>
+          <p:nvPr>
+            <p:ph idx="1"/>
+          </p:nvPr>
+        </p:nvSpPr>
+        <p:spPr>
+          <a:xfrm>
+            <a:off x="302605" y="1347759"/>
+            <a:ext cx="11554963" cy="1505177"/>
+          </a:xfrm>
+        </p:spPr>
+        <p:txBody>
+          <a:bodyPr/>
+          <a:lstStyle/>
+          <a:p>
+            <a:pPr marL="0" indent="0">
+              <a:buNone/>
+            </a:pPr>
+            <a:endParaRPr lang="de-DE" dirty="0"/>
+          </a:p>
+        </p:txBody>
+      </p:sp>
+      <p:sp>
+        <p:nvSpPr>
+          <p:cNvPr id="4" name="Foliennummernplatzhalter 3"/>
+          <p:cNvSpPr>
+            <a:spLocks noGrp="1"/>
+          </p:cNvSpPr>
+          <p:nvPr>
+            <p:ph type="sldNum" sz="quarter" idx="4"/>
+          </p:nvPr>
+        </p:nvSpPr>
+        <p:spPr/>
+        <p:txBody>
+          <a:bodyPr/>
+          <a:lstStyle/>
+          <a:p>
+            <a:pPr>
+              <a:defRPr/>
+            </a:pPr>
+            <a:fld id="{70BFFA52-4234-45F6-B1A6-074E24FF43A2}" type="slidenum">
+              <a:rPr lang="de-DE" smtClean="0"/>
+              <a:pPr>
+                <a:defRPr/>
+              </a:pPr>
+              <a:t>14</a:t>
+            </a:fld>
+            <a:endParaRPr lang="de-DE" dirty="0"/>
+          </a:p>
+        </p:txBody>
+      </p:sp>
+      <p:sp>
+        <p:nvSpPr>
+          <p:cNvPr id="5" name="Fußzeilenplatzhalter 4"/>
+          <p:cNvSpPr>
+            <a:spLocks noGrp="1"/>
+          </p:cNvSpPr>
+          <p:nvPr>
+            <p:ph type="ftr" sz="quarter" idx="3"/>
+          </p:nvPr>
+        </p:nvSpPr>
+        <p:spPr>
+          <a:solidFill>
+            <a:srgbClr val="C6C7BE"/>
+          </a:solidFill>
+        </p:spPr>
+        <p:txBody>
+          <a:bodyPr/>
+          <a:lstStyle/>
+          <a:p>
+            <a:r>
+              <a:rPr lang="de-DE" dirty="0"/>
+              <a:t>Zwischenpräsentation am 21.12.2020</a:t>
+            </a:r>
+          </a:p>
+        </p:txBody>
+      </p:sp>
+      <p:sp>
+        <p:nvSpPr>
+          <p:cNvPr id="7" name="Rechteck 6">
+            <a:extLst>
+              <a:ext uri="{FF2B5EF4-FFF2-40B4-BE49-F238E27FC236}">
+                <a16:creationId xmlns:a16="http://schemas.microsoft.com/office/drawing/2014/main" id="{29390B17-4145-41B9-82BB-F790CBEBDE6D}"/>
+              </a:ext>
+            </a:extLst>
+          </p:cNvPr>
+          <p:cNvSpPr/>
+          <p:nvPr/>
+        </p:nvSpPr>
+        <p:spPr bwMode="auto">
+          <a:xfrm>
+            <a:off x="9300356" y="188640"/>
+            <a:ext cx="1800200" cy="792088"/>
+          </a:xfrm>
+          <a:prstGeom prst="rect">
+            <a:avLst/>
+          </a:prstGeom>
+          <a:solidFill>
+            <a:srgbClr val="C6C7BE"/>
+          </a:solidFill>
+          <a:ln w="12700" cap="flat" cmpd="sng" algn="ctr">
+            <a:solidFill>
+              <a:srgbClr val="C6C7BE"/>
+            </a:solidFill>
+            <a:prstDash val="solid"/>
+            <a:round/>
+            <a:headEnd type="none" w="med" len="med"/>
+            <a:tailEnd type="none" w="med" len="med"/>
+          </a:ln>
+          <a:effectLst/>
+        </p:spPr>
+        <p:txBody>
+          <a:bodyPr vert="horz" wrap="square" lIns="91440" tIns="45720" rIns="91440" bIns="45720" numCol="1" rtlCol="0" anchor="ctr" anchorCtr="0" compatLnSpc="1">
+            <a:prstTxWarp prst="textNoShape">
+              <a:avLst/>
+            </a:prstTxWarp>
+          </a:bodyPr>
+          <a:lstStyle/>
+          <a:p>
+            <a:pPr marL="0" marR="0" indent="0" algn="l" defTabSz="914400" rtl="0" eaLnBrk="0" fontAlgn="base" latinLnBrk="0" hangingPunct="0">
+              <a:lnSpc>
+                <a:spcPct val="100000"/>
+              </a:lnSpc>
+              <a:spcBef>
+                <a:spcPct val="0"/>
+              </a:spcBef>
+              <a:spcAft>
+                <a:spcPct val="0"/>
+              </a:spcAft>
+              <a:buClrTx/>
+              <a:buSzTx/>
+              <a:buFontTx/>
+              <a:buNone/>
+              <a:tabLst/>
+            </a:pPr>
+            <a:endParaRPr kumimoji="0" lang="de-DE" sz="1400" b="0" i="0" u="none" strike="noStrike" cap="none" normalizeH="0" baseline="0" dirty="0">
+              <a:ln>
+                <a:noFill/>
+              </a:ln>
+              <a:solidFill>
+                <a:schemeClr val="tx1"/>
+              </a:solidFill>
+              <a:effectLst/>
+              <a:latin typeface="LMU CompatilFact" pitchFamily="2" charset="0"/>
+            </a:endParaRPr>
+          </a:p>
+        </p:txBody>
+      </p:sp>
+      <p:sp>
+        <p:nvSpPr>
+          <p:cNvPr id="8" name="Textplatzhalter 10">
+            <a:extLst>
+              <a:ext uri="{FF2B5EF4-FFF2-40B4-BE49-F238E27FC236}">
+                <a16:creationId xmlns:a16="http://schemas.microsoft.com/office/drawing/2014/main" id="{684298D9-AF3C-4E36-981C-BC14C51ED7F3}"/>
+              </a:ext>
+            </a:extLst>
+          </p:cNvPr>
+          <p:cNvSpPr>
+            <a:spLocks noGrp="1"/>
+          </p:cNvSpPr>
+          <p:nvPr>
+            <p:ph type="title"/>
+          </p:nvPr>
+        </p:nvSpPr>
+        <p:spPr>
+          <a:xfrm>
+            <a:off x="2207568" y="620713"/>
+            <a:ext cx="6768752" cy="457200"/>
+          </a:xfrm>
+        </p:spPr>
+        <p:txBody>
+          <a:bodyPr/>
+          <a:lstStyle/>
+          <a:p>
+            <a:r>
+              <a:rPr lang="de-DE" b="0" dirty="0"/>
+              <a:t>Katja </a:t>
+            </a:r>
+            <a:r>
+              <a:rPr lang="de-DE" b="0" dirty="0" err="1"/>
+              <a:t>Gutmair</a:t>
+            </a:r>
+            <a:r>
+              <a:rPr lang="de-DE" b="0" dirty="0"/>
+              <a:t>, Stella </a:t>
+            </a:r>
+            <a:r>
+              <a:rPr lang="de-DE" b="0" dirty="0" err="1"/>
+              <a:t>Akouete</a:t>
+            </a:r>
+            <a:r>
+              <a:rPr lang="de-DE" b="0" dirty="0"/>
+              <a:t>, Noah </a:t>
+            </a:r>
+            <a:r>
+              <a:rPr lang="de-DE" b="0" dirty="0" err="1"/>
+              <a:t>Hurmer</a:t>
+            </a:r>
+            <a:r>
+              <a:rPr lang="de-DE" b="0" dirty="0"/>
+              <a:t> und Anne </a:t>
+            </a:r>
+            <a:r>
+              <a:rPr lang="de-DE" b="0" dirty="0" err="1"/>
+              <a:t>Gritto</a:t>
+            </a:r>
+            <a:endParaRPr lang="de-DE" b="0" dirty="0"/>
+          </a:p>
+        </p:txBody>
+      </p:sp>
+      <p:sp>
+        <p:nvSpPr>
+          <p:cNvPr id="9" name="Textfeld 8">
+            <a:extLst>
+              <a:ext uri="{FF2B5EF4-FFF2-40B4-BE49-F238E27FC236}">
+                <a16:creationId xmlns:a16="http://schemas.microsoft.com/office/drawing/2014/main" id="{9384E611-4063-43BC-B19B-9DDAB886DBCE}"/>
+              </a:ext>
+            </a:extLst>
+          </p:cNvPr>
+          <p:cNvSpPr txBox="1"/>
+          <p:nvPr/>
+        </p:nvSpPr>
+        <p:spPr>
+          <a:xfrm>
+            <a:off x="9272180" y="658682"/>
+            <a:ext cx="2585388" cy="400110"/>
+          </a:xfrm>
+          <a:prstGeom prst="rect">
+            <a:avLst/>
+          </a:prstGeom>
+          <a:noFill/>
+        </p:spPr>
+        <p:txBody>
+          <a:bodyPr wrap="none" rtlCol="0">
+            <a:spAutoFit/>
+          </a:bodyPr>
+          <a:lstStyle/>
+          <a:p>
+            <a:r>
+              <a:rPr lang="de-DE" sz="2000" dirty="0">
+                <a:solidFill>
+                  <a:srgbClr val="006C30"/>
+                </a:solidFill>
+              </a:rPr>
+              <a:t>Statistisches Praktikum</a:t>
+            </a:r>
+          </a:p>
+        </p:txBody>
+      </p:sp>
+    </p:spTree>
+    <p:extLst>
+      <p:ext uri="{BB962C8B-B14F-4D97-AF65-F5344CB8AC3E}">
+        <p14:creationId xmlns:p14="http://schemas.microsoft.com/office/powerpoint/2010/main" val="1592585429"/>
+      </p:ext>
+    </p:extLst>
+  </p:cSld>
+  <p:clrMapOvr>
+    <a:masterClrMapping/>
+  </p:clrMapOvr>
+  <p:transition spd="med"/>
+</p:sld>
+</file>
+
+<file path=ppt/slides/slide2.xml><?xml version="1.0" encoding="utf-8"?>
+<p:sld xmlns:a="http://schemas.openxmlformats.org/drawingml/2006/main" xmlns:r="http://schemas.openxmlformats.org/officeDocument/2006/relationships" xmlns:p="http://schemas.openxmlformats.org/presentationml/2006/main">
+  <p:cSld>
+    <p:spTree>
+      <p:nvGrpSpPr>
+        <p:cNvPr id="1" name=""/>
+        <p:cNvGrpSpPr/>
+        <p:nvPr/>
+      </p:nvGrpSpPr>
+      <p:grpSpPr>
+        <a:xfrm>
+          <a:off x="0" y="0"/>
+          <a:ext cx="0" cy="0"/>
+          <a:chOff x="0" y="0"/>
+          <a:chExt cx="0" cy="0"/>
+        </a:xfrm>
+      </p:grpSpPr>
+      <p:sp>
+        <p:nvSpPr>
+          <p:cNvPr id="4" name="Foliennummernplatzhalter 3"/>
+          <p:cNvSpPr>
+            <a:spLocks noGrp="1"/>
+          </p:cNvSpPr>
+          <p:nvPr>
+            <p:ph type="sldNum" sz="quarter" idx="4"/>
+          </p:nvPr>
+        </p:nvSpPr>
+        <p:spPr/>
+        <p:txBody>
+          <a:bodyPr/>
+          <a:lstStyle/>
+          <a:p>
+            <a:pPr>
+              <a:defRPr/>
+            </a:pPr>
+            <a:fld id="{70BFFA52-4234-45F6-B1A6-074E24FF43A2}" type="slidenum">
+              <a:rPr lang="de-DE" smtClean="0"/>
+              <a:pPr>
+                <a:defRPr/>
+              </a:pPr>
+              <a:t>2</a:t>
+            </a:fld>
+            <a:endParaRPr lang="de-DE" dirty="0"/>
+          </a:p>
+        </p:txBody>
+      </p:sp>
+      <p:sp>
+        <p:nvSpPr>
+          <p:cNvPr id="5" name="Fußzeilenplatzhalter 4"/>
+          <p:cNvSpPr>
+            <a:spLocks noGrp="1"/>
+          </p:cNvSpPr>
+          <p:nvPr>
+            <p:ph type="ftr" sz="quarter" idx="3"/>
+          </p:nvPr>
+        </p:nvSpPr>
+        <p:spPr>
+          <a:solidFill>
+            <a:srgbClr val="C6C7BE"/>
+          </a:solidFill>
+        </p:spPr>
+        <p:txBody>
+          <a:bodyPr/>
+          <a:lstStyle/>
+          <a:p>
+            <a:r>
+              <a:rPr lang="de-DE" dirty="0"/>
+              <a:t>Zwischenpräsentation am 21.12.2020</a:t>
+            </a:r>
+          </a:p>
+        </p:txBody>
+      </p:sp>
+      <p:sp>
+        <p:nvSpPr>
+          <p:cNvPr id="7" name="Rechteck 6">
+            <a:extLst>
+              <a:ext uri="{FF2B5EF4-FFF2-40B4-BE49-F238E27FC236}">
+                <a16:creationId xmlns:a16="http://schemas.microsoft.com/office/drawing/2014/main" id="{29390B17-4145-41B9-82BB-F790CBEBDE6D}"/>
+              </a:ext>
+            </a:extLst>
+          </p:cNvPr>
+          <p:cNvSpPr/>
+          <p:nvPr/>
+        </p:nvSpPr>
+        <p:spPr bwMode="auto">
+          <a:xfrm>
+            <a:off x="9300356" y="188640"/>
+            <a:ext cx="1800200" cy="792088"/>
+          </a:xfrm>
+          <a:prstGeom prst="rect">
+            <a:avLst/>
+          </a:prstGeom>
+          <a:solidFill>
+            <a:srgbClr val="C6C7BE"/>
+          </a:solidFill>
+          <a:ln w="12700" cap="flat" cmpd="sng" algn="ctr">
+            <a:solidFill>
+              <a:srgbClr val="C6C7BE"/>
+            </a:solidFill>
+            <a:prstDash val="solid"/>
+            <a:round/>
+            <a:headEnd type="none" w="med" len="med"/>
+            <a:tailEnd type="none" w="med" len="med"/>
+          </a:ln>
+          <a:effectLst/>
+        </p:spPr>
+        <p:txBody>
+          <a:bodyPr vert="horz" wrap="square" lIns="91440" tIns="45720" rIns="91440" bIns="45720" numCol="1" rtlCol="0" anchor="ctr" anchorCtr="0" compatLnSpc="1">
+            <a:prstTxWarp prst="textNoShape">
+              <a:avLst/>
+            </a:prstTxWarp>
+          </a:bodyPr>
+          <a:lstStyle/>
+          <a:p>
+            <a:pPr marL="0" marR="0" indent="0" algn="l" defTabSz="914400" rtl="0" eaLnBrk="0" fontAlgn="base" latinLnBrk="0" hangingPunct="0">
+              <a:lnSpc>
+                <a:spcPct val="100000"/>
+              </a:lnSpc>
+              <a:spcBef>
+                <a:spcPct val="0"/>
+              </a:spcBef>
+              <a:spcAft>
+                <a:spcPct val="0"/>
+              </a:spcAft>
+              <a:buClrTx/>
+              <a:buSzTx/>
+              <a:buFontTx/>
+              <a:buNone/>
+              <a:tabLst/>
+            </a:pPr>
+            <a:endParaRPr kumimoji="0" lang="de-DE" sz="1400" b="0" i="0" u="none" strike="noStrike" cap="none" normalizeH="0" baseline="0" dirty="0">
+              <a:ln>
+                <a:noFill/>
+              </a:ln>
+              <a:solidFill>
+                <a:schemeClr val="tx1"/>
+              </a:solidFill>
+              <a:effectLst/>
+              <a:latin typeface="LMU CompatilFact" pitchFamily="2" charset="0"/>
+            </a:endParaRPr>
+          </a:p>
+        </p:txBody>
+      </p:sp>
+      <p:sp>
+        <p:nvSpPr>
+          <p:cNvPr id="8" name="Textplatzhalter 10">
+            <a:extLst>
+              <a:ext uri="{FF2B5EF4-FFF2-40B4-BE49-F238E27FC236}">
+                <a16:creationId xmlns:a16="http://schemas.microsoft.com/office/drawing/2014/main" id="{684298D9-AF3C-4E36-981C-BC14C51ED7F3}"/>
+              </a:ext>
+            </a:extLst>
+          </p:cNvPr>
+          <p:cNvSpPr>
+            <a:spLocks noGrp="1"/>
+          </p:cNvSpPr>
+          <p:nvPr>
+            <p:ph type="title"/>
+          </p:nvPr>
+        </p:nvSpPr>
+        <p:spPr>
+          <a:xfrm>
+            <a:off x="2207568" y="620713"/>
+            <a:ext cx="6768752" cy="457200"/>
+          </a:xfrm>
+        </p:spPr>
+        <p:txBody>
+          <a:bodyPr/>
+          <a:lstStyle/>
+          <a:p>
+            <a:r>
+              <a:rPr lang="de-DE" b="0" dirty="0"/>
+              <a:t>Katja </a:t>
+            </a:r>
+            <a:r>
+              <a:rPr lang="de-DE" b="0" dirty="0" err="1"/>
+              <a:t>Gutmair</a:t>
+            </a:r>
+            <a:r>
+              <a:rPr lang="de-DE" b="0" dirty="0"/>
+              <a:t>, Stella </a:t>
+            </a:r>
+            <a:r>
+              <a:rPr lang="de-DE" b="0" dirty="0" err="1"/>
+              <a:t>Akouete</a:t>
+            </a:r>
+            <a:r>
+              <a:rPr lang="de-DE" b="0" dirty="0"/>
+              <a:t>, Noah </a:t>
+            </a:r>
+            <a:r>
+              <a:rPr lang="de-DE" b="0" dirty="0" err="1"/>
+              <a:t>Hurmer</a:t>
+            </a:r>
+            <a:r>
+              <a:rPr lang="de-DE" b="0" dirty="0"/>
+              <a:t> und Anne </a:t>
+            </a:r>
+            <a:r>
+              <a:rPr lang="de-DE" b="0" dirty="0" err="1"/>
+              <a:t>Gritto</a:t>
+            </a:r>
+            <a:endParaRPr lang="de-DE" b="0" dirty="0"/>
+          </a:p>
+        </p:txBody>
+      </p:sp>
+      <p:sp>
+        <p:nvSpPr>
+          <p:cNvPr id="9" name="Textfeld 8">
+            <a:extLst>
+              <a:ext uri="{FF2B5EF4-FFF2-40B4-BE49-F238E27FC236}">
+                <a16:creationId xmlns:a16="http://schemas.microsoft.com/office/drawing/2014/main" id="{9384E611-4063-43BC-B19B-9DDAB886DBCE}"/>
+              </a:ext>
+            </a:extLst>
+          </p:cNvPr>
+          <p:cNvSpPr txBox="1"/>
+          <p:nvPr/>
+        </p:nvSpPr>
+        <p:spPr>
+          <a:xfrm>
+            <a:off x="9272180" y="658682"/>
+            <a:ext cx="2585388" cy="400110"/>
+          </a:xfrm>
+          <a:prstGeom prst="rect">
+            <a:avLst/>
+          </a:prstGeom>
+          <a:noFill/>
+        </p:spPr>
+        <p:txBody>
+          <a:bodyPr wrap="none" rtlCol="0">
+            <a:spAutoFit/>
+          </a:bodyPr>
+          <a:lstStyle/>
+          <a:p>
+            <a:r>
+              <a:rPr lang="de-DE" sz="2000" dirty="0">
+                <a:solidFill>
+                  <a:srgbClr val="006C30"/>
+                </a:solidFill>
+              </a:rPr>
+              <a:t>Statistisches Praktikum</a:t>
+            </a:r>
+          </a:p>
+        </p:txBody>
+      </p:sp>
+      <p:sp>
+        <p:nvSpPr>
+          <p:cNvPr id="6" name="Inhaltsplatzhalter 5">
+            <a:extLst>
+              <a:ext uri="{FF2B5EF4-FFF2-40B4-BE49-F238E27FC236}">
+                <a16:creationId xmlns:a16="http://schemas.microsoft.com/office/drawing/2014/main" id="{09D0F9AB-3489-418A-80B9-C2B818D92EC4}"/>
+              </a:ext>
+            </a:extLst>
+          </p:cNvPr>
+          <p:cNvSpPr>
+            <a:spLocks noGrp="1"/>
+          </p:cNvSpPr>
+          <p:nvPr>
+            <p:ph idx="1"/>
+          </p:nvPr>
+        </p:nvSpPr>
+        <p:spPr>
+          <a:xfrm>
+            <a:off x="158965" y="2168861"/>
+            <a:ext cx="11554963" cy="3816424"/>
+          </a:xfrm>
+        </p:spPr>
+        <p:txBody>
+          <a:bodyPr/>
+          <a:lstStyle/>
+          <a:p>
+            <a:pPr marL="457200" indent="-457200">
+              <a:buAutoNum type="arabicPeriod"/>
+            </a:pPr>
+            <a:r>
+              <a:rPr lang="de-DE" sz="2800" dirty="0"/>
+              <a:t>Vorstellen des Projekts</a:t>
+            </a:r>
+          </a:p>
+          <a:p>
+            <a:pPr marL="457200" indent="-457200">
+              <a:buAutoNum type="arabicPeriod"/>
+            </a:pPr>
+            <a:r>
+              <a:rPr lang="de-DE" sz="2800" dirty="0"/>
+              <a:t>Einführung in Clustern</a:t>
+            </a:r>
+          </a:p>
+        </p:txBody>
+      </p:sp>
+      <p:sp>
+        <p:nvSpPr>
+          <p:cNvPr id="11" name="Textplatzhalter 4">
+            <a:extLst>
+              <a:ext uri="{FF2B5EF4-FFF2-40B4-BE49-F238E27FC236}">
+                <a16:creationId xmlns:a16="http://schemas.microsoft.com/office/drawing/2014/main" id="{87489741-22AB-47C0-B5C9-500374B00FF5}"/>
+              </a:ext>
+            </a:extLst>
+          </p:cNvPr>
+          <p:cNvSpPr txBox="1">
+            <a:spLocks/>
+          </p:cNvSpPr>
+          <p:nvPr/>
+        </p:nvSpPr>
+        <p:spPr>
+          <a:xfrm>
+            <a:off x="318518" y="1304764"/>
+            <a:ext cx="11554963" cy="757980"/>
+          </a:xfrm>
+          <a:prstGeom prst="rect">
+            <a:avLst/>
+          </a:prstGeom>
+        </p:spPr>
+        <p:txBody>
+          <a:bodyPr/>
+          <a:lstStyle>
+            <a:lvl1pPr marL="342900" indent="-342900" algn="l" rtl="0" eaLnBrk="0" fontAlgn="base" hangingPunct="0">
+              <a:lnSpc>
+                <a:spcPct val="100000"/>
+              </a:lnSpc>
+              <a:spcBef>
+                <a:spcPts val="0"/>
+              </a:spcBef>
+              <a:spcAft>
+                <a:spcPts val="600"/>
+              </a:spcAft>
+              <a:buClrTx/>
+              <a:buChar char="•"/>
+              <a:defRPr sz="2400">
+                <a:solidFill>
+                  <a:schemeClr val="tx1"/>
+                </a:solidFill>
+                <a:latin typeface="+mn-lt"/>
+                <a:ea typeface="+mn-ea"/>
+                <a:cs typeface="+mn-cs"/>
+              </a:defRPr>
+            </a:lvl1pPr>
+            <a:lvl2pPr marL="742950" indent="-285750" algn="l" rtl="0" eaLnBrk="0" fontAlgn="base" hangingPunct="0">
+              <a:lnSpc>
+                <a:spcPct val="100000"/>
+              </a:lnSpc>
+              <a:spcBef>
+                <a:spcPts val="0"/>
+              </a:spcBef>
+              <a:spcAft>
+                <a:spcPts val="600"/>
+              </a:spcAft>
+              <a:buClrTx/>
+              <a:buFont typeface="Times" pitchFamily="18" charset="0"/>
+              <a:buChar char="•"/>
+              <a:defRPr sz="1600">
+                <a:solidFill>
+                  <a:schemeClr val="tx1"/>
+                </a:solidFill>
+                <a:latin typeface="+mn-lt"/>
+              </a:defRPr>
+            </a:lvl2pPr>
+            <a:lvl3pPr marL="1143000" indent="-228600" algn="l" rtl="0" eaLnBrk="0" fontAlgn="base" hangingPunct="0">
+              <a:lnSpc>
+                <a:spcPct val="100000"/>
+              </a:lnSpc>
+              <a:spcBef>
+                <a:spcPts val="0"/>
+              </a:spcBef>
+              <a:spcAft>
+                <a:spcPts val="600"/>
+              </a:spcAft>
+              <a:buClrTx/>
+              <a:buFont typeface="LMU CompatilFact" pitchFamily="2" charset="0"/>
+              <a:buChar char="–"/>
+              <a:defRPr sz="1600">
+                <a:solidFill>
+                  <a:schemeClr val="tx1"/>
+                </a:solidFill>
+                <a:latin typeface="+mn-lt"/>
+              </a:defRPr>
+            </a:lvl3pPr>
+            <a:lvl4pPr marL="1562100" indent="-228600" algn="l" rtl="0" eaLnBrk="0" fontAlgn="base" hangingPunct="0">
+              <a:lnSpc>
+                <a:spcPct val="100000"/>
+              </a:lnSpc>
+              <a:spcBef>
+                <a:spcPts val="0"/>
+              </a:spcBef>
+              <a:spcAft>
+                <a:spcPts val="600"/>
+              </a:spcAft>
+              <a:buClrTx/>
+              <a:buChar char="-"/>
+              <a:defRPr sz="1600">
+                <a:solidFill>
+                  <a:schemeClr val="tx1"/>
+                </a:solidFill>
+                <a:latin typeface="+mn-lt"/>
+              </a:defRPr>
+            </a:lvl4pPr>
+            <a:lvl5pPr marL="1981200" indent="-228600" algn="l" rtl="0" eaLnBrk="0" fontAlgn="base" hangingPunct="0">
+              <a:lnSpc>
+                <a:spcPct val="100000"/>
+              </a:lnSpc>
+              <a:spcBef>
+                <a:spcPts val="0"/>
+              </a:spcBef>
+              <a:spcAft>
+                <a:spcPts val="600"/>
+              </a:spcAft>
+              <a:buClrTx/>
+              <a:buChar char="»"/>
+              <a:defRPr sz="1600">
+                <a:solidFill>
+                  <a:schemeClr val="tx1"/>
+                </a:solidFill>
+                <a:latin typeface="+mn-lt"/>
+              </a:defRPr>
+            </a:lvl5pPr>
+            <a:lvl6pPr marL="2438400" indent="-228600" algn="l" rtl="0" fontAlgn="base">
+              <a:spcBef>
+                <a:spcPct val="20000"/>
+              </a:spcBef>
+              <a:spcAft>
+                <a:spcPct val="0"/>
+              </a:spcAft>
+              <a:defRPr sz="1600">
+                <a:solidFill>
+                  <a:srgbClr val="006C30"/>
+                </a:solidFill>
+                <a:latin typeface="+mn-lt"/>
+              </a:defRPr>
+            </a:lvl6pPr>
+            <a:lvl7pPr marL="2895600" indent="-228600" algn="l" rtl="0" fontAlgn="base">
+              <a:spcBef>
+                <a:spcPct val="20000"/>
+              </a:spcBef>
+              <a:spcAft>
+                <a:spcPct val="0"/>
+              </a:spcAft>
+              <a:defRPr sz="1600">
+                <a:solidFill>
+                  <a:srgbClr val="006C30"/>
+                </a:solidFill>
+                <a:latin typeface="+mn-lt"/>
+              </a:defRPr>
+            </a:lvl7pPr>
+            <a:lvl8pPr marL="3352800" indent="-228600" algn="l" rtl="0" fontAlgn="base">
+              <a:spcBef>
+                <a:spcPct val="20000"/>
+              </a:spcBef>
+              <a:spcAft>
+                <a:spcPct val="0"/>
+              </a:spcAft>
+              <a:defRPr sz="1600">
+                <a:solidFill>
+                  <a:srgbClr val="006C30"/>
+                </a:solidFill>
+                <a:latin typeface="+mn-lt"/>
+              </a:defRPr>
+            </a:lvl8pPr>
+            <a:lvl9pPr marL="3810000" indent="-228600" algn="l" rtl="0" fontAlgn="base">
+              <a:spcBef>
+                <a:spcPct val="20000"/>
+              </a:spcBef>
+              <a:spcAft>
+                <a:spcPct val="0"/>
+              </a:spcAft>
+              <a:defRPr sz="1600">
+                <a:solidFill>
+                  <a:srgbClr val="006C30"/>
+                </a:solidFill>
+                <a:latin typeface="+mn-lt"/>
+              </a:defRPr>
+            </a:lvl9pPr>
+          </a:lstStyle>
+          <a:p>
+            <a:pPr marL="0" indent="0">
+              <a:buNone/>
+            </a:pPr>
+            <a:r>
+              <a:rPr lang="de-DE" sz="4800" b="1" kern="0" dirty="0"/>
+              <a:t>Gliederung</a:t>
+            </a:r>
+            <a:endParaRPr lang="en-GB" sz="3200" b="1" kern="0" dirty="0"/>
           </a:p>
         </p:txBody>
       </p:sp>
@@ -2604,36 +4276,6 @@
       </p:grpSpPr>
       <p:sp>
         <p:nvSpPr>
-          <p:cNvPr id="3" name="Inhaltsplatzhalter 2"/>
-          <p:cNvSpPr>
-            <a:spLocks noGrp="1"/>
-          </p:cNvSpPr>
-          <p:nvPr>
-            <p:ph idx="1"/>
-          </p:nvPr>
-        </p:nvSpPr>
-        <p:spPr>
-          <a:xfrm>
-            <a:off x="302605" y="1347759"/>
-            <a:ext cx="11554963" cy="1505177"/>
-          </a:xfrm>
-        </p:spPr>
-        <p:txBody>
-          <a:bodyPr/>
-          <a:lstStyle/>
-          <a:p>
-            <a:pPr marL="0" indent="0">
-              <a:buNone/>
-            </a:pPr>
-            <a:r>
-              <a:rPr lang="de-DE" dirty="0"/>
-              <a:t>Grundidee beim Clustern: möglichst homogene Gruppen bilden, die untereinander möglichst heterogen sind, hierarchisches Clustering, Partitioniertes Clustering…</a:t>
-            </a:r>
-          </a:p>
-        </p:txBody>
-      </p:sp>
-      <p:sp>
-        <p:nvSpPr>
           <p:cNvPr id="4" name="Foliennummernplatzhalter 3"/>
           <p:cNvSpPr>
             <a:spLocks noGrp="1"/>
@@ -2859,10 +4501,73 @@
           </a:p>
         </p:txBody>
       </p:sp>
+      <p:sp>
+        <p:nvSpPr>
+          <p:cNvPr id="6" name="Inhaltsplatzhalter 5">
+            <a:extLst>
+              <a:ext uri="{FF2B5EF4-FFF2-40B4-BE49-F238E27FC236}">
+                <a16:creationId xmlns:a16="http://schemas.microsoft.com/office/drawing/2014/main" id="{09D0F9AB-3489-418A-80B9-C2B818D92EC4}"/>
+              </a:ext>
+            </a:extLst>
+          </p:cNvPr>
+          <p:cNvSpPr>
+            <a:spLocks noGrp="1"/>
+          </p:cNvSpPr>
+          <p:nvPr>
+            <p:ph idx="1"/>
+          </p:nvPr>
+        </p:nvSpPr>
+        <p:spPr>
+          <a:xfrm>
+            <a:off x="155340" y="1528834"/>
+            <a:ext cx="11554963" cy="3816424"/>
+          </a:xfrm>
+        </p:spPr>
+        <p:txBody>
+          <a:bodyPr/>
+          <a:lstStyle/>
+          <a:p>
+            <a:pPr marL="914400" indent="-914400">
+              <a:buAutoNum type="arabicPeriod"/>
+            </a:pPr>
+            <a:r>
+              <a:rPr lang="de-DE" sz="4800" b="1" dirty="0"/>
+              <a:t>Vorstellen des Projekts</a:t>
+            </a:r>
+          </a:p>
+          <a:p>
+            <a:pPr marL="0" indent="0">
+              <a:buNone/>
+            </a:pPr>
+            <a:endParaRPr lang="de-DE" sz="900" b="1" dirty="0"/>
+          </a:p>
+          <a:p>
+            <a:r>
+              <a:rPr lang="de-DE" sz="2800" dirty="0"/>
+              <a:t>Forschungsprojekt</a:t>
+            </a:r>
+          </a:p>
+          <a:p>
+            <a:r>
+              <a:rPr lang="de-DE" sz="2800" dirty="0"/>
+              <a:t>Übergeordnete Fragestellung: Wie verändert sich das Auftreten verschiedener Großwetterlagen (GWL) unter Einfluss des Klimawandels?</a:t>
+            </a:r>
+          </a:p>
+          <a:p>
+            <a:r>
+              <a:rPr lang="de-DE" sz="2800" dirty="0"/>
+              <a:t>2 Datensätze: Reanalyse Datensatz ERA-20C mit Wetterdaten und ein Katalog zu historischen Großwetterlagen</a:t>
+            </a:r>
+          </a:p>
+          <a:p>
+            <a:endParaRPr lang="de-DE" sz="2800" dirty="0"/>
+          </a:p>
+        </p:txBody>
+      </p:sp>
     </p:spTree>
     <p:extLst>
       <p:ext uri="{BB962C8B-B14F-4D97-AF65-F5344CB8AC3E}">
-        <p14:creationId xmlns:p14="http://schemas.microsoft.com/office/powerpoint/2010/main" val="4265196740"/>
+        <p14:creationId xmlns:p14="http://schemas.microsoft.com/office/powerpoint/2010/main" val="3125450453"/>
       </p:ext>
     </p:extLst>
   </p:cSld>
@@ -2892,36 +4597,6 @@
       </p:grpSpPr>
       <p:sp>
         <p:nvSpPr>
-          <p:cNvPr id="3" name="Inhaltsplatzhalter 2"/>
-          <p:cNvSpPr>
-            <a:spLocks noGrp="1"/>
-          </p:cNvSpPr>
-          <p:nvPr>
-            <p:ph idx="1"/>
-          </p:nvPr>
-        </p:nvSpPr>
-        <p:spPr>
-          <a:xfrm>
-            <a:off x="302605" y="1347759"/>
-            <a:ext cx="11554963" cy="1505177"/>
-          </a:xfrm>
-        </p:spPr>
-        <p:txBody>
-          <a:bodyPr/>
-          <a:lstStyle/>
-          <a:p>
-            <a:pPr marL="0" indent="0">
-              <a:buNone/>
-            </a:pPr>
-            <a:r>
-              <a:rPr lang="de-DE" dirty="0"/>
-              <a:t>Cluster Versuch mit 320 Dimensionen </a:t>
-            </a:r>
-          </a:p>
-        </p:txBody>
-      </p:sp>
-      <p:sp>
-        <p:nvSpPr>
           <p:cNvPr id="4" name="Foliennummernplatzhalter 3"/>
           <p:cNvSpPr>
             <a:spLocks noGrp="1"/>
@@ -3147,10 +4822,477 @@
           </a:p>
         </p:txBody>
       </p:sp>
+      <p:sp>
+        <p:nvSpPr>
+          <p:cNvPr id="3" name="Inhaltsplatzhalter 2">
+            <a:extLst>
+              <a:ext uri="{FF2B5EF4-FFF2-40B4-BE49-F238E27FC236}">
+                <a16:creationId xmlns:a16="http://schemas.microsoft.com/office/drawing/2014/main" id="{8480A894-B728-4E4F-B28E-A188777B451F}"/>
+              </a:ext>
+            </a:extLst>
+          </p:cNvPr>
+          <p:cNvSpPr>
+            <a:spLocks noGrp="1"/>
+          </p:cNvSpPr>
+          <p:nvPr>
+            <p:ph idx="1"/>
+          </p:nvPr>
+        </p:nvSpPr>
+        <p:spPr>
+          <a:xfrm>
+            <a:off x="302605" y="2319536"/>
+            <a:ext cx="11554963" cy="533400"/>
+          </a:xfrm>
+        </p:spPr>
+        <p:txBody>
+          <a:bodyPr/>
+          <a:lstStyle/>
+          <a:p>
+            <a:r>
+              <a:rPr lang="de-DE" sz="2800" dirty="0"/>
+              <a:t>8x20 </a:t>
+            </a:r>
+            <a:r>
+              <a:rPr lang="de-DE" sz="2800" dirty="0" err="1"/>
+              <a:t>Grid</a:t>
+            </a:r>
+            <a:r>
+              <a:rPr lang="de-DE" sz="2800" dirty="0"/>
+              <a:t> mit Messungen über Europa und Atlantik</a:t>
+            </a:r>
+            <a:endParaRPr lang="en-GB" sz="2800" dirty="0"/>
+          </a:p>
+          <a:p>
+            <a:endParaRPr lang="de-DE" dirty="0"/>
+          </a:p>
+        </p:txBody>
+      </p:sp>
+      <p:sp>
+        <p:nvSpPr>
+          <p:cNvPr id="12" name="Textplatzhalter 4">
+            <a:extLst>
+              <a:ext uri="{FF2B5EF4-FFF2-40B4-BE49-F238E27FC236}">
+                <a16:creationId xmlns:a16="http://schemas.microsoft.com/office/drawing/2014/main" id="{D3A54566-C011-4326-BC0B-AFE1CB755628}"/>
+              </a:ext>
+            </a:extLst>
+          </p:cNvPr>
+          <p:cNvSpPr txBox="1">
+            <a:spLocks/>
+          </p:cNvSpPr>
+          <p:nvPr/>
+        </p:nvSpPr>
+        <p:spPr>
+          <a:xfrm>
+            <a:off x="302605" y="1266864"/>
+            <a:ext cx="11554963" cy="757980"/>
+          </a:xfrm>
+          <a:prstGeom prst="rect">
+            <a:avLst/>
+          </a:prstGeom>
+        </p:spPr>
+        <p:txBody>
+          <a:bodyPr/>
+          <a:lstStyle>
+            <a:lvl1pPr marL="342900" indent="-342900" algn="l" rtl="0" eaLnBrk="0" fontAlgn="base" hangingPunct="0">
+              <a:lnSpc>
+                <a:spcPct val="100000"/>
+              </a:lnSpc>
+              <a:spcBef>
+                <a:spcPts val="0"/>
+              </a:spcBef>
+              <a:spcAft>
+                <a:spcPts val="600"/>
+              </a:spcAft>
+              <a:buClrTx/>
+              <a:buChar char="•"/>
+              <a:defRPr sz="2400">
+                <a:solidFill>
+                  <a:schemeClr val="tx1"/>
+                </a:solidFill>
+                <a:latin typeface="+mn-lt"/>
+                <a:ea typeface="+mn-ea"/>
+                <a:cs typeface="+mn-cs"/>
+              </a:defRPr>
+            </a:lvl1pPr>
+            <a:lvl2pPr marL="742950" indent="-285750" algn="l" rtl="0" eaLnBrk="0" fontAlgn="base" hangingPunct="0">
+              <a:lnSpc>
+                <a:spcPct val="100000"/>
+              </a:lnSpc>
+              <a:spcBef>
+                <a:spcPts val="0"/>
+              </a:spcBef>
+              <a:spcAft>
+                <a:spcPts val="600"/>
+              </a:spcAft>
+              <a:buClrTx/>
+              <a:buFont typeface="Times" pitchFamily="18" charset="0"/>
+              <a:buChar char="•"/>
+              <a:defRPr sz="1600">
+                <a:solidFill>
+                  <a:schemeClr val="tx1"/>
+                </a:solidFill>
+                <a:latin typeface="+mn-lt"/>
+              </a:defRPr>
+            </a:lvl2pPr>
+            <a:lvl3pPr marL="1143000" indent="-228600" algn="l" rtl="0" eaLnBrk="0" fontAlgn="base" hangingPunct="0">
+              <a:lnSpc>
+                <a:spcPct val="100000"/>
+              </a:lnSpc>
+              <a:spcBef>
+                <a:spcPts val="0"/>
+              </a:spcBef>
+              <a:spcAft>
+                <a:spcPts val="600"/>
+              </a:spcAft>
+              <a:buClrTx/>
+              <a:buFont typeface="LMU CompatilFact" pitchFamily="2" charset="0"/>
+              <a:buChar char="–"/>
+              <a:defRPr sz="1600">
+                <a:solidFill>
+                  <a:schemeClr val="tx1"/>
+                </a:solidFill>
+                <a:latin typeface="+mn-lt"/>
+              </a:defRPr>
+            </a:lvl3pPr>
+            <a:lvl4pPr marL="1562100" indent="-228600" algn="l" rtl="0" eaLnBrk="0" fontAlgn="base" hangingPunct="0">
+              <a:lnSpc>
+                <a:spcPct val="100000"/>
+              </a:lnSpc>
+              <a:spcBef>
+                <a:spcPts val="0"/>
+              </a:spcBef>
+              <a:spcAft>
+                <a:spcPts val="600"/>
+              </a:spcAft>
+              <a:buClrTx/>
+              <a:buChar char="-"/>
+              <a:defRPr sz="1600">
+                <a:solidFill>
+                  <a:schemeClr val="tx1"/>
+                </a:solidFill>
+                <a:latin typeface="+mn-lt"/>
+              </a:defRPr>
+            </a:lvl4pPr>
+            <a:lvl5pPr marL="1981200" indent="-228600" algn="l" rtl="0" eaLnBrk="0" fontAlgn="base" hangingPunct="0">
+              <a:lnSpc>
+                <a:spcPct val="100000"/>
+              </a:lnSpc>
+              <a:spcBef>
+                <a:spcPts val="0"/>
+              </a:spcBef>
+              <a:spcAft>
+                <a:spcPts val="600"/>
+              </a:spcAft>
+              <a:buClrTx/>
+              <a:buChar char="»"/>
+              <a:defRPr sz="1600">
+                <a:solidFill>
+                  <a:schemeClr val="tx1"/>
+                </a:solidFill>
+                <a:latin typeface="+mn-lt"/>
+              </a:defRPr>
+            </a:lvl5pPr>
+            <a:lvl6pPr marL="2438400" indent="-228600" algn="l" rtl="0" fontAlgn="base">
+              <a:spcBef>
+                <a:spcPct val="20000"/>
+              </a:spcBef>
+              <a:spcAft>
+                <a:spcPct val="0"/>
+              </a:spcAft>
+              <a:defRPr sz="1600">
+                <a:solidFill>
+                  <a:srgbClr val="006C30"/>
+                </a:solidFill>
+                <a:latin typeface="+mn-lt"/>
+              </a:defRPr>
+            </a:lvl6pPr>
+            <a:lvl7pPr marL="2895600" indent="-228600" algn="l" rtl="0" fontAlgn="base">
+              <a:spcBef>
+                <a:spcPct val="20000"/>
+              </a:spcBef>
+              <a:spcAft>
+                <a:spcPct val="0"/>
+              </a:spcAft>
+              <a:defRPr sz="1600">
+                <a:solidFill>
+                  <a:srgbClr val="006C30"/>
+                </a:solidFill>
+                <a:latin typeface="+mn-lt"/>
+              </a:defRPr>
+            </a:lvl7pPr>
+            <a:lvl8pPr marL="3352800" indent="-228600" algn="l" rtl="0" fontAlgn="base">
+              <a:spcBef>
+                <a:spcPct val="20000"/>
+              </a:spcBef>
+              <a:spcAft>
+                <a:spcPct val="0"/>
+              </a:spcAft>
+              <a:defRPr sz="1600">
+                <a:solidFill>
+                  <a:srgbClr val="006C30"/>
+                </a:solidFill>
+                <a:latin typeface="+mn-lt"/>
+              </a:defRPr>
+            </a:lvl8pPr>
+            <a:lvl9pPr marL="3810000" indent="-228600" algn="l" rtl="0" fontAlgn="base">
+              <a:spcBef>
+                <a:spcPct val="20000"/>
+              </a:spcBef>
+              <a:spcAft>
+                <a:spcPct val="0"/>
+              </a:spcAft>
+              <a:defRPr sz="1600">
+                <a:solidFill>
+                  <a:srgbClr val="006C30"/>
+                </a:solidFill>
+                <a:latin typeface="+mn-lt"/>
+              </a:defRPr>
+            </a:lvl9pPr>
+          </a:lstStyle>
+          <a:p>
+            <a:endParaRPr lang="en-GB" kern="0" dirty="0"/>
+          </a:p>
+        </p:txBody>
+      </p:sp>
+      <p:sp>
+        <p:nvSpPr>
+          <p:cNvPr id="13" name="Textplatzhalter 4">
+            <a:extLst>
+              <a:ext uri="{FF2B5EF4-FFF2-40B4-BE49-F238E27FC236}">
+                <a16:creationId xmlns:a16="http://schemas.microsoft.com/office/drawing/2014/main" id="{18009493-1578-4098-8756-C183C1606E70}"/>
+              </a:ext>
+            </a:extLst>
+          </p:cNvPr>
+          <p:cNvSpPr txBox="1">
+            <a:spLocks/>
+          </p:cNvSpPr>
+          <p:nvPr/>
+        </p:nvSpPr>
+        <p:spPr>
+          <a:xfrm>
+            <a:off x="455005" y="1419264"/>
+            <a:ext cx="11554963" cy="757980"/>
+          </a:xfrm>
+          <a:prstGeom prst="rect">
+            <a:avLst/>
+          </a:prstGeom>
+        </p:spPr>
+        <p:txBody>
+          <a:bodyPr/>
+          <a:lstStyle>
+            <a:lvl1pPr marL="342900" indent="-342900" algn="l" rtl="0" eaLnBrk="0" fontAlgn="base" hangingPunct="0">
+              <a:lnSpc>
+                <a:spcPct val="100000"/>
+              </a:lnSpc>
+              <a:spcBef>
+                <a:spcPts val="0"/>
+              </a:spcBef>
+              <a:spcAft>
+                <a:spcPts val="600"/>
+              </a:spcAft>
+              <a:buClrTx/>
+              <a:buChar char="•"/>
+              <a:defRPr sz="2400">
+                <a:solidFill>
+                  <a:schemeClr val="tx1"/>
+                </a:solidFill>
+                <a:latin typeface="+mn-lt"/>
+                <a:ea typeface="+mn-ea"/>
+                <a:cs typeface="+mn-cs"/>
+              </a:defRPr>
+            </a:lvl1pPr>
+            <a:lvl2pPr marL="742950" indent="-285750" algn="l" rtl="0" eaLnBrk="0" fontAlgn="base" hangingPunct="0">
+              <a:lnSpc>
+                <a:spcPct val="100000"/>
+              </a:lnSpc>
+              <a:spcBef>
+                <a:spcPts val="0"/>
+              </a:spcBef>
+              <a:spcAft>
+                <a:spcPts val="600"/>
+              </a:spcAft>
+              <a:buClrTx/>
+              <a:buFont typeface="Times" pitchFamily="18" charset="0"/>
+              <a:buChar char="•"/>
+              <a:defRPr sz="1600">
+                <a:solidFill>
+                  <a:schemeClr val="tx1"/>
+                </a:solidFill>
+                <a:latin typeface="+mn-lt"/>
+              </a:defRPr>
+            </a:lvl2pPr>
+            <a:lvl3pPr marL="1143000" indent="-228600" algn="l" rtl="0" eaLnBrk="0" fontAlgn="base" hangingPunct="0">
+              <a:lnSpc>
+                <a:spcPct val="100000"/>
+              </a:lnSpc>
+              <a:spcBef>
+                <a:spcPts val="0"/>
+              </a:spcBef>
+              <a:spcAft>
+                <a:spcPts val="600"/>
+              </a:spcAft>
+              <a:buClrTx/>
+              <a:buFont typeface="LMU CompatilFact" pitchFamily="2" charset="0"/>
+              <a:buChar char="–"/>
+              <a:defRPr sz="1600">
+                <a:solidFill>
+                  <a:schemeClr val="tx1"/>
+                </a:solidFill>
+                <a:latin typeface="+mn-lt"/>
+              </a:defRPr>
+            </a:lvl3pPr>
+            <a:lvl4pPr marL="1562100" indent="-228600" algn="l" rtl="0" eaLnBrk="0" fontAlgn="base" hangingPunct="0">
+              <a:lnSpc>
+                <a:spcPct val="100000"/>
+              </a:lnSpc>
+              <a:spcBef>
+                <a:spcPts val="0"/>
+              </a:spcBef>
+              <a:spcAft>
+                <a:spcPts val="600"/>
+              </a:spcAft>
+              <a:buClrTx/>
+              <a:buChar char="-"/>
+              <a:defRPr sz="1600">
+                <a:solidFill>
+                  <a:schemeClr val="tx1"/>
+                </a:solidFill>
+                <a:latin typeface="+mn-lt"/>
+              </a:defRPr>
+            </a:lvl4pPr>
+            <a:lvl5pPr marL="1981200" indent="-228600" algn="l" rtl="0" eaLnBrk="0" fontAlgn="base" hangingPunct="0">
+              <a:lnSpc>
+                <a:spcPct val="100000"/>
+              </a:lnSpc>
+              <a:spcBef>
+                <a:spcPts val="0"/>
+              </a:spcBef>
+              <a:spcAft>
+                <a:spcPts val="600"/>
+              </a:spcAft>
+              <a:buClrTx/>
+              <a:buChar char="»"/>
+              <a:defRPr sz="1600">
+                <a:solidFill>
+                  <a:schemeClr val="tx1"/>
+                </a:solidFill>
+                <a:latin typeface="+mn-lt"/>
+              </a:defRPr>
+            </a:lvl5pPr>
+            <a:lvl6pPr marL="2438400" indent="-228600" algn="l" rtl="0" fontAlgn="base">
+              <a:spcBef>
+                <a:spcPct val="20000"/>
+              </a:spcBef>
+              <a:spcAft>
+                <a:spcPct val="0"/>
+              </a:spcAft>
+              <a:defRPr sz="1600">
+                <a:solidFill>
+                  <a:srgbClr val="006C30"/>
+                </a:solidFill>
+                <a:latin typeface="+mn-lt"/>
+              </a:defRPr>
+            </a:lvl6pPr>
+            <a:lvl7pPr marL="2895600" indent="-228600" algn="l" rtl="0" fontAlgn="base">
+              <a:spcBef>
+                <a:spcPct val="20000"/>
+              </a:spcBef>
+              <a:spcAft>
+                <a:spcPct val="0"/>
+              </a:spcAft>
+              <a:defRPr sz="1600">
+                <a:solidFill>
+                  <a:srgbClr val="006C30"/>
+                </a:solidFill>
+                <a:latin typeface="+mn-lt"/>
+              </a:defRPr>
+            </a:lvl7pPr>
+            <a:lvl8pPr marL="3352800" indent="-228600" algn="l" rtl="0" fontAlgn="base">
+              <a:spcBef>
+                <a:spcPct val="20000"/>
+              </a:spcBef>
+              <a:spcAft>
+                <a:spcPct val="0"/>
+              </a:spcAft>
+              <a:defRPr sz="1600">
+                <a:solidFill>
+                  <a:srgbClr val="006C30"/>
+                </a:solidFill>
+                <a:latin typeface="+mn-lt"/>
+              </a:defRPr>
+            </a:lvl8pPr>
+            <a:lvl9pPr marL="3810000" indent="-228600" algn="l" rtl="0" fontAlgn="base">
+              <a:spcBef>
+                <a:spcPct val="20000"/>
+              </a:spcBef>
+              <a:spcAft>
+                <a:spcPct val="0"/>
+              </a:spcAft>
+              <a:defRPr sz="1600">
+                <a:solidFill>
+                  <a:srgbClr val="006C30"/>
+                </a:solidFill>
+                <a:latin typeface="+mn-lt"/>
+              </a:defRPr>
+            </a:lvl9pPr>
+          </a:lstStyle>
+          <a:p>
+            <a:pPr marL="0" indent="0">
+              <a:buNone/>
+            </a:pPr>
+            <a:r>
+              <a:rPr lang="de-DE" sz="4800" b="1" dirty="0"/>
+              <a:t>Reanalyse Datensatz</a:t>
+            </a:r>
+            <a:endParaRPr lang="en-GB" sz="4800" b="1" dirty="0"/>
+          </a:p>
+          <a:p>
+            <a:pPr marL="0" indent="0">
+              <a:buNone/>
+            </a:pPr>
+            <a:endParaRPr lang="en-GB" kern="0" dirty="0"/>
+          </a:p>
+        </p:txBody>
+      </p:sp>
+      <p:pic>
+        <p:nvPicPr>
+          <p:cNvPr id="15" name="Grafik 14">
+            <a:extLst>
+              <a:ext uri="{FF2B5EF4-FFF2-40B4-BE49-F238E27FC236}">
+                <a16:creationId xmlns:a16="http://schemas.microsoft.com/office/drawing/2014/main" id="{1130551C-18C9-471F-AEAA-DAB3569D9AF2}"/>
+              </a:ext>
+            </a:extLst>
+          </p:cNvPr>
+          <p:cNvPicPr>
+            <a:picLocks noChangeAspect="1"/>
+          </p:cNvPicPr>
+          <p:nvPr/>
+        </p:nvPicPr>
+        <p:blipFill rotWithShape="1">
+          <a:blip r:embed="rId2">
+            <a:extLst>
+              <a:ext uri="{28A0092B-C50C-407E-A947-70E740481C1C}">
+                <a14:useLocalDpi xmlns:a14="http://schemas.microsoft.com/office/drawing/2010/main" val="0"/>
+              </a:ext>
+            </a:extLst>
+          </a:blip>
+          <a:srcRect t="15324" b="15588"/>
+          <a:stretch/>
+        </p:blipFill>
+        <p:spPr>
+          <a:xfrm>
+            <a:off x="776282" y="2997696"/>
+            <a:ext cx="5449060" cy="2994575"/>
+          </a:xfrm>
+          <a:prstGeom prst="rect">
+            <a:avLst/>
+          </a:prstGeom>
+        </p:spPr>
+      </p:pic>
     </p:spTree>
     <p:extLst>
       <p:ext uri="{BB962C8B-B14F-4D97-AF65-F5344CB8AC3E}">
-        <p14:creationId xmlns:p14="http://schemas.microsoft.com/office/powerpoint/2010/main" val="3950738348"/>
+        <p14:creationId xmlns:p14="http://schemas.microsoft.com/office/powerpoint/2010/main" val="427794334"/>
       </p:ext>
     </p:extLst>
   </p:cSld>
@@ -3180,44 +5322,6 @@
       </p:grpSpPr>
       <p:sp>
         <p:nvSpPr>
-          <p:cNvPr id="3" name="Inhaltsplatzhalter 2"/>
-          <p:cNvSpPr>
-            <a:spLocks noGrp="1"/>
-          </p:cNvSpPr>
-          <p:nvPr>
-            <p:ph idx="1"/>
-          </p:nvPr>
-        </p:nvSpPr>
-        <p:spPr>
-          <a:xfrm>
-            <a:off x="302605" y="1347759"/>
-            <a:ext cx="11554963" cy="1505177"/>
-          </a:xfrm>
-        </p:spPr>
-        <p:txBody>
-          <a:bodyPr/>
-          <a:lstStyle/>
-          <a:p>
-            <a:pPr marL="0" indent="0">
-              <a:buNone/>
-            </a:pPr>
-            <a:r>
-              <a:rPr lang="de-DE" dirty="0"/>
-              <a:t>Cluster Versuch mit 320 Dimensionen und </a:t>
-            </a:r>
-            <a:r>
-              <a:rPr lang="de-DE" dirty="0" err="1"/>
-              <a:t>Mahalanobis</a:t>
-            </a:r>
-            <a:r>
-              <a:rPr lang="de-DE" dirty="0"/>
-              <a:t> Distanz</a:t>
-            </a:r>
-          </a:p>
-        </p:txBody>
-      </p:sp>
-      <p:sp>
-        <p:nvSpPr>
           <p:cNvPr id="4" name="Foliennummernplatzhalter 3"/>
           <p:cNvSpPr>
             <a:spLocks noGrp="1"/>
@@ -3443,10 +5547,623 @@
           </a:p>
         </p:txBody>
       </p:sp>
+      <mc:AlternateContent xmlns:mc="http://schemas.openxmlformats.org/markup-compatibility/2006">
+        <mc:Choice xmlns:a14="http://schemas.microsoft.com/office/drawing/2010/main" Requires="a14">
+          <p:sp>
+            <p:nvSpPr>
+              <p:cNvPr id="3" name="Inhaltsplatzhalter 2">
+                <a:extLst>
+                  <a:ext uri="{FF2B5EF4-FFF2-40B4-BE49-F238E27FC236}">
+                    <a16:creationId xmlns:a16="http://schemas.microsoft.com/office/drawing/2014/main" id="{8480A894-B728-4E4F-B28E-A188777B451F}"/>
+                  </a:ext>
+                </a:extLst>
+              </p:cNvPr>
+              <p:cNvSpPr>
+                <a:spLocks noGrp="1"/>
+              </p:cNvSpPr>
+              <p:nvPr>
+                <p:ph idx="1"/>
+              </p:nvPr>
+            </p:nvSpPr>
+            <p:spPr>
+              <a:xfrm>
+                <a:off x="302605" y="2319536"/>
+                <a:ext cx="11554963" cy="3271600"/>
+              </a:xfrm>
+            </p:spPr>
+            <p:txBody>
+              <a:bodyPr/>
+              <a:lstStyle/>
+              <a:p>
+                <a:r>
+                  <a:rPr lang="de-DE" sz="2800" dirty="0"/>
+                  <a:t>Jeweils 4 Messungen am Tag</a:t>
+                </a:r>
+              </a:p>
+              <a:p>
+                <a:pPr lvl="2">
+                  <a:buFont typeface="Wingdings" panose="05000000000000000000" pitchFamily="2" charset="2"/>
+                  <a:buChar char="Ø"/>
+                </a:pPr>
+                <a:r>
+                  <a:rPr lang="de-DE" sz="2000" dirty="0"/>
+                  <a:t>     </a:t>
+                </a:r>
+                <a:r>
+                  <a:rPr lang="de-DE" sz="2400" dirty="0"/>
+                  <a:t>Vorerst Verwenden des Mittelwerts </a:t>
+                </a:r>
+                <a:r>
+                  <a:rPr lang="de-DE" sz="2000" dirty="0"/>
+                  <a:t>    </a:t>
+                </a:r>
+              </a:p>
+              <a:p>
+                <a:r>
+                  <a:rPr lang="de-DE" sz="2800" dirty="0"/>
+                  <a:t>Datenerhebung von 1900 – 2010</a:t>
+                </a:r>
+              </a:p>
+              <a:p>
+                <a:r>
+                  <a:rPr lang="de-DE" sz="2800" dirty="0"/>
+                  <a:t>Erhobene Variablen:</a:t>
+                </a:r>
+              </a:p>
+              <a:p>
+                <a:pPr lvl="2">
+                  <a:buFont typeface="Wingdings" panose="05000000000000000000" pitchFamily="2" charset="2"/>
+                  <a:buChar char="Ø"/>
+                </a:pPr>
+                <a:r>
+                  <a:rPr lang="de-DE" sz="2000" dirty="0"/>
+                  <a:t>     </a:t>
+                </a:r>
+                <a:r>
+                  <a:rPr lang="de-DE" sz="2400" dirty="0"/>
+                  <a:t>Luftdruck auf Meereshöhe in Pascal (</a:t>
+                </a:r>
+                <a:r>
+                  <a:rPr lang="de-DE" sz="2400" dirty="0" err="1"/>
+                  <a:t>mslp</a:t>
+                </a:r>
+                <a:r>
+                  <a:rPr lang="de-DE" sz="2400" dirty="0"/>
+                  <a:t>)</a:t>
+                </a:r>
+              </a:p>
+              <a:p>
+                <a:pPr lvl="2">
+                  <a:buFont typeface="Wingdings" panose="05000000000000000000" pitchFamily="2" charset="2"/>
+                  <a:buChar char="Ø"/>
+                </a:pPr>
+                <a:r>
+                  <a:rPr lang="de-DE" sz="2000" dirty="0"/>
+                  <a:t>     </a:t>
+                </a:r>
+                <a:r>
+                  <a:rPr lang="de-DE" sz="2400" dirty="0"/>
+                  <a:t>Geopotential auf 500 hPa in </a:t>
+                </a:r>
+                <a14:m>
+                  <m:oMath xmlns:m="http://schemas.openxmlformats.org/officeDocument/2006/math">
+                    <m:f>
+                      <m:fPr>
+                        <m:ctrlPr>
+                          <a:rPr lang="de-DE" sz="2000" smtClean="0">
+                            <a:latin typeface="Cambria Math" panose="02040503050406030204" pitchFamily="18" charset="0"/>
+                          </a:rPr>
+                        </m:ctrlPr>
+                      </m:fPr>
+                      <m:num>
+                        <m:sSup>
+                          <m:sSupPr>
+                            <m:ctrlPr>
+                              <a:rPr lang="de-DE" sz="2000" smtClean="0">
+                                <a:latin typeface="Cambria Math" panose="02040503050406030204" pitchFamily="18" charset="0"/>
+                              </a:rPr>
+                            </m:ctrlPr>
+                          </m:sSupPr>
+                          <m:e>
+                            <m:r>
+                              <a:rPr lang="de-DE" sz="2000" i="1" smtClean="0">
+                                <a:latin typeface="Cambria Math" panose="02040503050406030204" pitchFamily="18" charset="0"/>
+                              </a:rPr>
+                              <m:t>𝑚</m:t>
+                            </m:r>
+                          </m:e>
+                          <m:sup>
+                            <m:r>
+                              <a:rPr lang="de-DE" sz="2000" i="0" smtClean="0">
+                                <a:latin typeface="Cambria Math" panose="02040503050406030204" pitchFamily="18" charset="0"/>
+                              </a:rPr>
+                              <m:t>2</m:t>
+                            </m:r>
+                          </m:sup>
+                        </m:sSup>
+                      </m:num>
+                      <m:den>
+                        <m:sSup>
+                          <m:sSupPr>
+                            <m:ctrlPr>
+                              <a:rPr lang="de-DE" sz="2000" i="1" smtClean="0">
+                                <a:latin typeface="Cambria Math" panose="02040503050406030204" pitchFamily="18" charset="0"/>
+                              </a:rPr>
+                            </m:ctrlPr>
+                          </m:sSupPr>
+                          <m:e>
+                            <m:r>
+                              <a:rPr lang="de-DE" sz="2000" i="1" smtClean="0">
+                                <a:latin typeface="Cambria Math" panose="02040503050406030204" pitchFamily="18" charset="0"/>
+                              </a:rPr>
+                              <m:t>𝑠</m:t>
+                            </m:r>
+                          </m:e>
+                          <m:sup>
+                            <m:r>
+                              <a:rPr lang="de-DE" sz="2000" i="0" smtClean="0">
+                                <a:latin typeface="Cambria Math" panose="02040503050406030204" pitchFamily="18" charset="0"/>
+                              </a:rPr>
+                              <m:t>2</m:t>
+                            </m:r>
+                          </m:sup>
+                        </m:sSup>
+                      </m:den>
+                    </m:f>
+                  </m:oMath>
+                </a14:m>
+                <a:r>
+                  <a:rPr lang="de-DE" sz="2000" dirty="0"/>
+                  <a:t>              </a:t>
+                </a:r>
+              </a:p>
+              <a:p>
+                <a:pPr marL="0" indent="0">
+                  <a:buNone/>
+                </a:pPr>
+                <a:r>
+                  <a:rPr lang="de-DE" sz="2800" dirty="0"/>
+                  <a:t>       </a:t>
+                </a:r>
+              </a:p>
+            </p:txBody>
+          </p:sp>
+        </mc:Choice>
+        <mc:Fallback>
+          <p:sp>
+            <p:nvSpPr>
+              <p:cNvPr id="3" name="Inhaltsplatzhalter 2">
+                <a:extLst>
+                  <a:ext uri="{FF2B5EF4-FFF2-40B4-BE49-F238E27FC236}">
+                    <a16:creationId xmlns:a16="http://schemas.microsoft.com/office/drawing/2014/main" id="{8480A894-B728-4E4F-B28E-A188777B451F}"/>
+                  </a:ext>
+                </a:extLst>
+              </p:cNvPr>
+              <p:cNvSpPr>
+                <a:spLocks noGrp="1" noRot="1" noChangeAspect="1" noMove="1" noResize="1" noEditPoints="1" noAdjustHandles="1" noChangeArrowheads="1" noChangeShapeType="1" noTextEdit="1"/>
+              </p:cNvSpPr>
+              <p:nvPr>
+                <p:ph idx="1"/>
+              </p:nvPr>
+            </p:nvSpPr>
+            <p:spPr>
+              <a:xfrm>
+                <a:off x="302605" y="2319536"/>
+                <a:ext cx="11554963" cy="3271600"/>
+              </a:xfrm>
+              <a:blipFill>
+                <a:blip r:embed="rId2"/>
+                <a:stretch>
+                  <a:fillRect l="-1108" t="-2052"/>
+                </a:stretch>
+              </a:blipFill>
+            </p:spPr>
+            <p:txBody>
+              <a:bodyPr/>
+              <a:lstStyle/>
+              <a:p>
+                <a:r>
+                  <a:rPr lang="de-DE">
+                    <a:noFill/>
+                  </a:rPr>
+                  <a:t> </a:t>
+                </a:r>
+              </a:p>
+            </p:txBody>
+          </p:sp>
+        </mc:Fallback>
+      </mc:AlternateContent>
+      <p:sp>
+        <p:nvSpPr>
+          <p:cNvPr id="12" name="Textplatzhalter 4">
+            <a:extLst>
+              <a:ext uri="{FF2B5EF4-FFF2-40B4-BE49-F238E27FC236}">
+                <a16:creationId xmlns:a16="http://schemas.microsoft.com/office/drawing/2014/main" id="{D3A54566-C011-4326-BC0B-AFE1CB755628}"/>
+              </a:ext>
+            </a:extLst>
+          </p:cNvPr>
+          <p:cNvSpPr txBox="1">
+            <a:spLocks/>
+          </p:cNvSpPr>
+          <p:nvPr/>
+        </p:nvSpPr>
+        <p:spPr>
+          <a:xfrm>
+            <a:off x="302605" y="1266864"/>
+            <a:ext cx="11554963" cy="757980"/>
+          </a:xfrm>
+          <a:prstGeom prst="rect">
+            <a:avLst/>
+          </a:prstGeom>
+        </p:spPr>
+        <p:txBody>
+          <a:bodyPr/>
+          <a:lstStyle>
+            <a:lvl1pPr marL="342900" indent="-342900" algn="l" rtl="0" eaLnBrk="0" fontAlgn="base" hangingPunct="0">
+              <a:lnSpc>
+                <a:spcPct val="100000"/>
+              </a:lnSpc>
+              <a:spcBef>
+                <a:spcPts val="0"/>
+              </a:spcBef>
+              <a:spcAft>
+                <a:spcPts val="600"/>
+              </a:spcAft>
+              <a:buClrTx/>
+              <a:buChar char="•"/>
+              <a:defRPr sz="2400">
+                <a:solidFill>
+                  <a:schemeClr val="tx1"/>
+                </a:solidFill>
+                <a:latin typeface="+mn-lt"/>
+                <a:ea typeface="+mn-ea"/>
+                <a:cs typeface="+mn-cs"/>
+              </a:defRPr>
+            </a:lvl1pPr>
+            <a:lvl2pPr marL="742950" indent="-285750" algn="l" rtl="0" eaLnBrk="0" fontAlgn="base" hangingPunct="0">
+              <a:lnSpc>
+                <a:spcPct val="100000"/>
+              </a:lnSpc>
+              <a:spcBef>
+                <a:spcPts val="0"/>
+              </a:spcBef>
+              <a:spcAft>
+                <a:spcPts val="600"/>
+              </a:spcAft>
+              <a:buClrTx/>
+              <a:buFont typeface="Times" pitchFamily="18" charset="0"/>
+              <a:buChar char="•"/>
+              <a:defRPr sz="1600">
+                <a:solidFill>
+                  <a:schemeClr val="tx1"/>
+                </a:solidFill>
+                <a:latin typeface="+mn-lt"/>
+              </a:defRPr>
+            </a:lvl2pPr>
+            <a:lvl3pPr marL="1143000" indent="-228600" algn="l" rtl="0" eaLnBrk="0" fontAlgn="base" hangingPunct="0">
+              <a:lnSpc>
+                <a:spcPct val="100000"/>
+              </a:lnSpc>
+              <a:spcBef>
+                <a:spcPts val="0"/>
+              </a:spcBef>
+              <a:spcAft>
+                <a:spcPts val="600"/>
+              </a:spcAft>
+              <a:buClrTx/>
+              <a:buFont typeface="LMU CompatilFact" pitchFamily="2" charset="0"/>
+              <a:buChar char="–"/>
+              <a:defRPr sz="1600">
+                <a:solidFill>
+                  <a:schemeClr val="tx1"/>
+                </a:solidFill>
+                <a:latin typeface="+mn-lt"/>
+              </a:defRPr>
+            </a:lvl3pPr>
+            <a:lvl4pPr marL="1562100" indent="-228600" algn="l" rtl="0" eaLnBrk="0" fontAlgn="base" hangingPunct="0">
+              <a:lnSpc>
+                <a:spcPct val="100000"/>
+              </a:lnSpc>
+              <a:spcBef>
+                <a:spcPts val="0"/>
+              </a:spcBef>
+              <a:spcAft>
+                <a:spcPts val="600"/>
+              </a:spcAft>
+              <a:buClrTx/>
+              <a:buChar char="-"/>
+              <a:defRPr sz="1600">
+                <a:solidFill>
+                  <a:schemeClr val="tx1"/>
+                </a:solidFill>
+                <a:latin typeface="+mn-lt"/>
+              </a:defRPr>
+            </a:lvl4pPr>
+            <a:lvl5pPr marL="1981200" indent="-228600" algn="l" rtl="0" eaLnBrk="0" fontAlgn="base" hangingPunct="0">
+              <a:lnSpc>
+                <a:spcPct val="100000"/>
+              </a:lnSpc>
+              <a:spcBef>
+                <a:spcPts val="0"/>
+              </a:spcBef>
+              <a:spcAft>
+                <a:spcPts val="600"/>
+              </a:spcAft>
+              <a:buClrTx/>
+              <a:buChar char="»"/>
+              <a:defRPr sz="1600">
+                <a:solidFill>
+                  <a:schemeClr val="tx1"/>
+                </a:solidFill>
+                <a:latin typeface="+mn-lt"/>
+              </a:defRPr>
+            </a:lvl5pPr>
+            <a:lvl6pPr marL="2438400" indent="-228600" algn="l" rtl="0" fontAlgn="base">
+              <a:spcBef>
+                <a:spcPct val="20000"/>
+              </a:spcBef>
+              <a:spcAft>
+                <a:spcPct val="0"/>
+              </a:spcAft>
+              <a:defRPr sz="1600">
+                <a:solidFill>
+                  <a:srgbClr val="006C30"/>
+                </a:solidFill>
+                <a:latin typeface="+mn-lt"/>
+              </a:defRPr>
+            </a:lvl6pPr>
+            <a:lvl7pPr marL="2895600" indent="-228600" algn="l" rtl="0" fontAlgn="base">
+              <a:spcBef>
+                <a:spcPct val="20000"/>
+              </a:spcBef>
+              <a:spcAft>
+                <a:spcPct val="0"/>
+              </a:spcAft>
+              <a:defRPr sz="1600">
+                <a:solidFill>
+                  <a:srgbClr val="006C30"/>
+                </a:solidFill>
+                <a:latin typeface="+mn-lt"/>
+              </a:defRPr>
+            </a:lvl7pPr>
+            <a:lvl8pPr marL="3352800" indent="-228600" algn="l" rtl="0" fontAlgn="base">
+              <a:spcBef>
+                <a:spcPct val="20000"/>
+              </a:spcBef>
+              <a:spcAft>
+                <a:spcPct val="0"/>
+              </a:spcAft>
+              <a:defRPr sz="1600">
+                <a:solidFill>
+                  <a:srgbClr val="006C30"/>
+                </a:solidFill>
+                <a:latin typeface="+mn-lt"/>
+              </a:defRPr>
+            </a:lvl8pPr>
+            <a:lvl9pPr marL="3810000" indent="-228600" algn="l" rtl="0" fontAlgn="base">
+              <a:spcBef>
+                <a:spcPct val="20000"/>
+              </a:spcBef>
+              <a:spcAft>
+                <a:spcPct val="0"/>
+              </a:spcAft>
+              <a:defRPr sz="1600">
+                <a:solidFill>
+                  <a:srgbClr val="006C30"/>
+                </a:solidFill>
+                <a:latin typeface="+mn-lt"/>
+              </a:defRPr>
+            </a:lvl9pPr>
+          </a:lstStyle>
+          <a:p>
+            <a:endParaRPr lang="en-GB" kern="0" dirty="0"/>
+          </a:p>
+        </p:txBody>
+      </p:sp>
+      <p:sp>
+        <p:nvSpPr>
+          <p:cNvPr id="13" name="Textplatzhalter 4">
+            <a:extLst>
+              <a:ext uri="{FF2B5EF4-FFF2-40B4-BE49-F238E27FC236}">
+                <a16:creationId xmlns:a16="http://schemas.microsoft.com/office/drawing/2014/main" id="{18009493-1578-4098-8756-C183C1606E70}"/>
+              </a:ext>
+            </a:extLst>
+          </p:cNvPr>
+          <p:cNvSpPr txBox="1">
+            <a:spLocks/>
+          </p:cNvSpPr>
+          <p:nvPr/>
+        </p:nvSpPr>
+        <p:spPr>
+          <a:xfrm>
+            <a:off x="455005" y="1419264"/>
+            <a:ext cx="11554963" cy="757980"/>
+          </a:xfrm>
+          <a:prstGeom prst="rect">
+            <a:avLst/>
+          </a:prstGeom>
+        </p:spPr>
+        <p:txBody>
+          <a:bodyPr/>
+          <a:lstStyle>
+            <a:lvl1pPr marL="342900" indent="-342900" algn="l" rtl="0" eaLnBrk="0" fontAlgn="base" hangingPunct="0">
+              <a:lnSpc>
+                <a:spcPct val="100000"/>
+              </a:lnSpc>
+              <a:spcBef>
+                <a:spcPts val="0"/>
+              </a:spcBef>
+              <a:spcAft>
+                <a:spcPts val="600"/>
+              </a:spcAft>
+              <a:buClrTx/>
+              <a:buChar char="•"/>
+              <a:defRPr sz="2400">
+                <a:solidFill>
+                  <a:schemeClr val="tx1"/>
+                </a:solidFill>
+                <a:latin typeface="+mn-lt"/>
+                <a:ea typeface="+mn-ea"/>
+                <a:cs typeface="+mn-cs"/>
+              </a:defRPr>
+            </a:lvl1pPr>
+            <a:lvl2pPr marL="742950" indent="-285750" algn="l" rtl="0" eaLnBrk="0" fontAlgn="base" hangingPunct="0">
+              <a:lnSpc>
+                <a:spcPct val="100000"/>
+              </a:lnSpc>
+              <a:spcBef>
+                <a:spcPts val="0"/>
+              </a:spcBef>
+              <a:spcAft>
+                <a:spcPts val="600"/>
+              </a:spcAft>
+              <a:buClrTx/>
+              <a:buFont typeface="Times" pitchFamily="18" charset="0"/>
+              <a:buChar char="•"/>
+              <a:defRPr sz="1600">
+                <a:solidFill>
+                  <a:schemeClr val="tx1"/>
+                </a:solidFill>
+                <a:latin typeface="+mn-lt"/>
+              </a:defRPr>
+            </a:lvl2pPr>
+            <a:lvl3pPr marL="1143000" indent="-228600" algn="l" rtl="0" eaLnBrk="0" fontAlgn="base" hangingPunct="0">
+              <a:lnSpc>
+                <a:spcPct val="100000"/>
+              </a:lnSpc>
+              <a:spcBef>
+                <a:spcPts val="0"/>
+              </a:spcBef>
+              <a:spcAft>
+                <a:spcPts val="600"/>
+              </a:spcAft>
+              <a:buClrTx/>
+              <a:buFont typeface="LMU CompatilFact" pitchFamily="2" charset="0"/>
+              <a:buChar char="–"/>
+              <a:defRPr sz="1600">
+                <a:solidFill>
+                  <a:schemeClr val="tx1"/>
+                </a:solidFill>
+                <a:latin typeface="+mn-lt"/>
+              </a:defRPr>
+            </a:lvl3pPr>
+            <a:lvl4pPr marL="1562100" indent="-228600" algn="l" rtl="0" eaLnBrk="0" fontAlgn="base" hangingPunct="0">
+              <a:lnSpc>
+                <a:spcPct val="100000"/>
+              </a:lnSpc>
+              <a:spcBef>
+                <a:spcPts val="0"/>
+              </a:spcBef>
+              <a:spcAft>
+                <a:spcPts val="600"/>
+              </a:spcAft>
+              <a:buClrTx/>
+              <a:buChar char="-"/>
+              <a:defRPr sz="1600">
+                <a:solidFill>
+                  <a:schemeClr val="tx1"/>
+                </a:solidFill>
+                <a:latin typeface="+mn-lt"/>
+              </a:defRPr>
+            </a:lvl4pPr>
+            <a:lvl5pPr marL="1981200" indent="-228600" algn="l" rtl="0" eaLnBrk="0" fontAlgn="base" hangingPunct="0">
+              <a:lnSpc>
+                <a:spcPct val="100000"/>
+              </a:lnSpc>
+              <a:spcBef>
+                <a:spcPts val="0"/>
+              </a:spcBef>
+              <a:spcAft>
+                <a:spcPts val="600"/>
+              </a:spcAft>
+              <a:buClrTx/>
+              <a:buChar char="»"/>
+              <a:defRPr sz="1600">
+                <a:solidFill>
+                  <a:schemeClr val="tx1"/>
+                </a:solidFill>
+                <a:latin typeface="+mn-lt"/>
+              </a:defRPr>
+            </a:lvl5pPr>
+            <a:lvl6pPr marL="2438400" indent="-228600" algn="l" rtl="0" fontAlgn="base">
+              <a:spcBef>
+                <a:spcPct val="20000"/>
+              </a:spcBef>
+              <a:spcAft>
+                <a:spcPct val="0"/>
+              </a:spcAft>
+              <a:defRPr sz="1600">
+                <a:solidFill>
+                  <a:srgbClr val="006C30"/>
+                </a:solidFill>
+                <a:latin typeface="+mn-lt"/>
+              </a:defRPr>
+            </a:lvl6pPr>
+            <a:lvl7pPr marL="2895600" indent="-228600" algn="l" rtl="0" fontAlgn="base">
+              <a:spcBef>
+                <a:spcPct val="20000"/>
+              </a:spcBef>
+              <a:spcAft>
+                <a:spcPct val="0"/>
+              </a:spcAft>
+              <a:defRPr sz="1600">
+                <a:solidFill>
+                  <a:srgbClr val="006C30"/>
+                </a:solidFill>
+                <a:latin typeface="+mn-lt"/>
+              </a:defRPr>
+            </a:lvl7pPr>
+            <a:lvl8pPr marL="3352800" indent="-228600" algn="l" rtl="0" fontAlgn="base">
+              <a:spcBef>
+                <a:spcPct val="20000"/>
+              </a:spcBef>
+              <a:spcAft>
+                <a:spcPct val="0"/>
+              </a:spcAft>
+              <a:defRPr sz="1600">
+                <a:solidFill>
+                  <a:srgbClr val="006C30"/>
+                </a:solidFill>
+                <a:latin typeface="+mn-lt"/>
+              </a:defRPr>
+            </a:lvl8pPr>
+            <a:lvl9pPr marL="3810000" indent="-228600" algn="l" rtl="0" fontAlgn="base">
+              <a:spcBef>
+                <a:spcPct val="20000"/>
+              </a:spcBef>
+              <a:spcAft>
+                <a:spcPct val="0"/>
+              </a:spcAft>
+              <a:defRPr sz="1600">
+                <a:solidFill>
+                  <a:srgbClr val="006C30"/>
+                </a:solidFill>
+                <a:latin typeface="+mn-lt"/>
+              </a:defRPr>
+            </a:lvl9pPr>
+          </a:lstStyle>
+          <a:p>
+            <a:pPr marL="0" indent="0">
+              <a:buNone/>
+            </a:pPr>
+            <a:r>
+              <a:rPr lang="de-DE" sz="4800" b="1" dirty="0"/>
+              <a:t>Reanalyse Datensatz</a:t>
+            </a:r>
+            <a:endParaRPr lang="en-GB" sz="4800" b="1" dirty="0"/>
+          </a:p>
+          <a:p>
+            <a:pPr marL="0" indent="0">
+              <a:buNone/>
+            </a:pPr>
+            <a:endParaRPr lang="en-GB" kern="0" dirty="0"/>
+          </a:p>
+        </p:txBody>
+      </p:sp>
     </p:spTree>
     <p:extLst>
       <p:ext uri="{BB962C8B-B14F-4D97-AF65-F5344CB8AC3E}">
-        <p14:creationId xmlns:p14="http://schemas.microsoft.com/office/powerpoint/2010/main" val="525843294"/>
+        <p14:creationId xmlns:p14="http://schemas.microsoft.com/office/powerpoint/2010/main" val="3081709184"/>
       </p:ext>
     </p:extLst>
   </p:cSld>
@@ -3476,52 +6193,6 @@
       </p:grpSpPr>
       <p:sp>
         <p:nvSpPr>
-          <p:cNvPr id="3" name="Inhaltsplatzhalter 2"/>
-          <p:cNvSpPr>
-            <a:spLocks noGrp="1"/>
-          </p:cNvSpPr>
-          <p:nvPr>
-            <p:ph idx="1"/>
-          </p:nvPr>
-        </p:nvSpPr>
-        <p:spPr>
-          <a:xfrm>
-            <a:off x="302605" y="1347759"/>
-            <a:ext cx="11554963" cy="1505177"/>
-          </a:xfrm>
-        </p:spPr>
-        <p:txBody>
-          <a:bodyPr/>
-          <a:lstStyle/>
-          <a:p>
-            <a:pPr marL="0" indent="0">
-              <a:buNone/>
-            </a:pPr>
-            <a:r>
-              <a:rPr lang="de-DE" dirty="0"/>
-              <a:t>PCA Versuch: </a:t>
-            </a:r>
-            <a:r>
-              <a:rPr lang="de-DE" dirty="0" err="1"/>
-              <a:t>elbow</a:t>
-            </a:r>
-            <a:r>
-              <a:rPr lang="de-DE" dirty="0"/>
-              <a:t> Plot, generell erklären, </a:t>
-            </a:r>
-            <a:r>
-              <a:rPr lang="de-DE" dirty="0" err="1"/>
-              <a:t>cluster</a:t>
-            </a:r>
-            <a:r>
-              <a:rPr lang="de-DE" dirty="0"/>
-              <a:t> zeigen, Mosaikplot</a:t>
-            </a:r>
-          </a:p>
-        </p:txBody>
-      </p:sp>
-      <p:sp>
-        <p:nvSpPr>
           <p:cNvPr id="4" name="Foliennummernplatzhalter 3"/>
           <p:cNvSpPr>
             <a:spLocks noGrp="1"/>
@@ -3747,10 +6418,573 @@
           </a:p>
         </p:txBody>
       </p:sp>
+      <p:sp>
+        <p:nvSpPr>
+          <p:cNvPr id="12" name="Textplatzhalter 4">
+            <a:extLst>
+              <a:ext uri="{FF2B5EF4-FFF2-40B4-BE49-F238E27FC236}">
+                <a16:creationId xmlns:a16="http://schemas.microsoft.com/office/drawing/2014/main" id="{D3A54566-C011-4326-BC0B-AFE1CB755628}"/>
+              </a:ext>
+            </a:extLst>
+          </p:cNvPr>
+          <p:cNvSpPr txBox="1">
+            <a:spLocks/>
+          </p:cNvSpPr>
+          <p:nvPr/>
+        </p:nvSpPr>
+        <p:spPr>
+          <a:xfrm>
+            <a:off x="302605" y="1266864"/>
+            <a:ext cx="11554963" cy="757980"/>
+          </a:xfrm>
+          <a:prstGeom prst="rect">
+            <a:avLst/>
+          </a:prstGeom>
+        </p:spPr>
+        <p:txBody>
+          <a:bodyPr/>
+          <a:lstStyle>
+            <a:lvl1pPr marL="342900" indent="-342900" algn="l" rtl="0" eaLnBrk="0" fontAlgn="base" hangingPunct="0">
+              <a:lnSpc>
+                <a:spcPct val="100000"/>
+              </a:lnSpc>
+              <a:spcBef>
+                <a:spcPts val="0"/>
+              </a:spcBef>
+              <a:spcAft>
+                <a:spcPts val="600"/>
+              </a:spcAft>
+              <a:buClrTx/>
+              <a:buChar char="•"/>
+              <a:defRPr sz="2400">
+                <a:solidFill>
+                  <a:schemeClr val="tx1"/>
+                </a:solidFill>
+                <a:latin typeface="+mn-lt"/>
+                <a:ea typeface="+mn-ea"/>
+                <a:cs typeface="+mn-cs"/>
+              </a:defRPr>
+            </a:lvl1pPr>
+            <a:lvl2pPr marL="742950" indent="-285750" algn="l" rtl="0" eaLnBrk="0" fontAlgn="base" hangingPunct="0">
+              <a:lnSpc>
+                <a:spcPct val="100000"/>
+              </a:lnSpc>
+              <a:spcBef>
+                <a:spcPts val="0"/>
+              </a:spcBef>
+              <a:spcAft>
+                <a:spcPts val="600"/>
+              </a:spcAft>
+              <a:buClrTx/>
+              <a:buFont typeface="Times" pitchFamily="18" charset="0"/>
+              <a:buChar char="•"/>
+              <a:defRPr sz="1600">
+                <a:solidFill>
+                  <a:schemeClr val="tx1"/>
+                </a:solidFill>
+                <a:latin typeface="+mn-lt"/>
+              </a:defRPr>
+            </a:lvl2pPr>
+            <a:lvl3pPr marL="1143000" indent="-228600" algn="l" rtl="0" eaLnBrk="0" fontAlgn="base" hangingPunct="0">
+              <a:lnSpc>
+                <a:spcPct val="100000"/>
+              </a:lnSpc>
+              <a:spcBef>
+                <a:spcPts val="0"/>
+              </a:spcBef>
+              <a:spcAft>
+                <a:spcPts val="600"/>
+              </a:spcAft>
+              <a:buClrTx/>
+              <a:buFont typeface="LMU CompatilFact" pitchFamily="2" charset="0"/>
+              <a:buChar char="–"/>
+              <a:defRPr sz="1600">
+                <a:solidFill>
+                  <a:schemeClr val="tx1"/>
+                </a:solidFill>
+                <a:latin typeface="+mn-lt"/>
+              </a:defRPr>
+            </a:lvl3pPr>
+            <a:lvl4pPr marL="1562100" indent="-228600" algn="l" rtl="0" eaLnBrk="0" fontAlgn="base" hangingPunct="0">
+              <a:lnSpc>
+                <a:spcPct val="100000"/>
+              </a:lnSpc>
+              <a:spcBef>
+                <a:spcPts val="0"/>
+              </a:spcBef>
+              <a:spcAft>
+                <a:spcPts val="600"/>
+              </a:spcAft>
+              <a:buClrTx/>
+              <a:buChar char="-"/>
+              <a:defRPr sz="1600">
+                <a:solidFill>
+                  <a:schemeClr val="tx1"/>
+                </a:solidFill>
+                <a:latin typeface="+mn-lt"/>
+              </a:defRPr>
+            </a:lvl4pPr>
+            <a:lvl5pPr marL="1981200" indent="-228600" algn="l" rtl="0" eaLnBrk="0" fontAlgn="base" hangingPunct="0">
+              <a:lnSpc>
+                <a:spcPct val="100000"/>
+              </a:lnSpc>
+              <a:spcBef>
+                <a:spcPts val="0"/>
+              </a:spcBef>
+              <a:spcAft>
+                <a:spcPts val="600"/>
+              </a:spcAft>
+              <a:buClrTx/>
+              <a:buChar char="»"/>
+              <a:defRPr sz="1600">
+                <a:solidFill>
+                  <a:schemeClr val="tx1"/>
+                </a:solidFill>
+                <a:latin typeface="+mn-lt"/>
+              </a:defRPr>
+            </a:lvl5pPr>
+            <a:lvl6pPr marL="2438400" indent="-228600" algn="l" rtl="0" fontAlgn="base">
+              <a:spcBef>
+                <a:spcPct val="20000"/>
+              </a:spcBef>
+              <a:spcAft>
+                <a:spcPct val="0"/>
+              </a:spcAft>
+              <a:defRPr sz="1600">
+                <a:solidFill>
+                  <a:srgbClr val="006C30"/>
+                </a:solidFill>
+                <a:latin typeface="+mn-lt"/>
+              </a:defRPr>
+            </a:lvl6pPr>
+            <a:lvl7pPr marL="2895600" indent="-228600" algn="l" rtl="0" fontAlgn="base">
+              <a:spcBef>
+                <a:spcPct val="20000"/>
+              </a:spcBef>
+              <a:spcAft>
+                <a:spcPct val="0"/>
+              </a:spcAft>
+              <a:defRPr sz="1600">
+                <a:solidFill>
+                  <a:srgbClr val="006C30"/>
+                </a:solidFill>
+                <a:latin typeface="+mn-lt"/>
+              </a:defRPr>
+            </a:lvl7pPr>
+            <a:lvl8pPr marL="3352800" indent="-228600" algn="l" rtl="0" fontAlgn="base">
+              <a:spcBef>
+                <a:spcPct val="20000"/>
+              </a:spcBef>
+              <a:spcAft>
+                <a:spcPct val="0"/>
+              </a:spcAft>
+              <a:defRPr sz="1600">
+                <a:solidFill>
+                  <a:srgbClr val="006C30"/>
+                </a:solidFill>
+                <a:latin typeface="+mn-lt"/>
+              </a:defRPr>
+            </a:lvl8pPr>
+            <a:lvl9pPr marL="3810000" indent="-228600" algn="l" rtl="0" fontAlgn="base">
+              <a:spcBef>
+                <a:spcPct val="20000"/>
+              </a:spcBef>
+              <a:spcAft>
+                <a:spcPct val="0"/>
+              </a:spcAft>
+              <a:defRPr sz="1600">
+                <a:solidFill>
+                  <a:srgbClr val="006C30"/>
+                </a:solidFill>
+                <a:latin typeface="+mn-lt"/>
+              </a:defRPr>
+            </a:lvl9pPr>
+          </a:lstStyle>
+          <a:p>
+            <a:endParaRPr lang="en-GB" kern="0" dirty="0"/>
+          </a:p>
+        </p:txBody>
+      </p:sp>
+      <p:sp>
+        <p:nvSpPr>
+          <p:cNvPr id="13" name="Textplatzhalter 4">
+            <a:extLst>
+              <a:ext uri="{FF2B5EF4-FFF2-40B4-BE49-F238E27FC236}">
+                <a16:creationId xmlns:a16="http://schemas.microsoft.com/office/drawing/2014/main" id="{18009493-1578-4098-8756-C183C1606E70}"/>
+              </a:ext>
+            </a:extLst>
+          </p:cNvPr>
+          <p:cNvSpPr txBox="1">
+            <a:spLocks/>
+          </p:cNvSpPr>
+          <p:nvPr/>
+        </p:nvSpPr>
+        <p:spPr>
+          <a:xfrm>
+            <a:off x="455005" y="1419264"/>
+            <a:ext cx="11554963" cy="757980"/>
+          </a:xfrm>
+          <a:prstGeom prst="rect">
+            <a:avLst/>
+          </a:prstGeom>
+        </p:spPr>
+        <p:txBody>
+          <a:bodyPr/>
+          <a:lstStyle>
+            <a:lvl1pPr marL="342900" indent="-342900" algn="l" rtl="0" eaLnBrk="0" fontAlgn="base" hangingPunct="0">
+              <a:lnSpc>
+                <a:spcPct val="100000"/>
+              </a:lnSpc>
+              <a:spcBef>
+                <a:spcPts val="0"/>
+              </a:spcBef>
+              <a:spcAft>
+                <a:spcPts val="600"/>
+              </a:spcAft>
+              <a:buClrTx/>
+              <a:buChar char="•"/>
+              <a:defRPr sz="2400">
+                <a:solidFill>
+                  <a:schemeClr val="tx1"/>
+                </a:solidFill>
+                <a:latin typeface="+mn-lt"/>
+                <a:ea typeface="+mn-ea"/>
+                <a:cs typeface="+mn-cs"/>
+              </a:defRPr>
+            </a:lvl1pPr>
+            <a:lvl2pPr marL="742950" indent="-285750" algn="l" rtl="0" eaLnBrk="0" fontAlgn="base" hangingPunct="0">
+              <a:lnSpc>
+                <a:spcPct val="100000"/>
+              </a:lnSpc>
+              <a:spcBef>
+                <a:spcPts val="0"/>
+              </a:spcBef>
+              <a:spcAft>
+                <a:spcPts val="600"/>
+              </a:spcAft>
+              <a:buClrTx/>
+              <a:buFont typeface="Times" pitchFamily="18" charset="0"/>
+              <a:buChar char="•"/>
+              <a:defRPr sz="1600">
+                <a:solidFill>
+                  <a:schemeClr val="tx1"/>
+                </a:solidFill>
+                <a:latin typeface="+mn-lt"/>
+              </a:defRPr>
+            </a:lvl2pPr>
+            <a:lvl3pPr marL="1143000" indent="-228600" algn="l" rtl="0" eaLnBrk="0" fontAlgn="base" hangingPunct="0">
+              <a:lnSpc>
+                <a:spcPct val="100000"/>
+              </a:lnSpc>
+              <a:spcBef>
+                <a:spcPts val="0"/>
+              </a:spcBef>
+              <a:spcAft>
+                <a:spcPts val="600"/>
+              </a:spcAft>
+              <a:buClrTx/>
+              <a:buFont typeface="LMU CompatilFact" pitchFamily="2" charset="0"/>
+              <a:buChar char="–"/>
+              <a:defRPr sz="1600">
+                <a:solidFill>
+                  <a:schemeClr val="tx1"/>
+                </a:solidFill>
+                <a:latin typeface="+mn-lt"/>
+              </a:defRPr>
+            </a:lvl3pPr>
+            <a:lvl4pPr marL="1562100" indent="-228600" algn="l" rtl="0" eaLnBrk="0" fontAlgn="base" hangingPunct="0">
+              <a:lnSpc>
+                <a:spcPct val="100000"/>
+              </a:lnSpc>
+              <a:spcBef>
+                <a:spcPts val="0"/>
+              </a:spcBef>
+              <a:spcAft>
+                <a:spcPts val="600"/>
+              </a:spcAft>
+              <a:buClrTx/>
+              <a:buChar char="-"/>
+              <a:defRPr sz="1600">
+                <a:solidFill>
+                  <a:schemeClr val="tx1"/>
+                </a:solidFill>
+                <a:latin typeface="+mn-lt"/>
+              </a:defRPr>
+            </a:lvl4pPr>
+            <a:lvl5pPr marL="1981200" indent="-228600" algn="l" rtl="0" eaLnBrk="0" fontAlgn="base" hangingPunct="0">
+              <a:lnSpc>
+                <a:spcPct val="100000"/>
+              </a:lnSpc>
+              <a:spcBef>
+                <a:spcPts val="0"/>
+              </a:spcBef>
+              <a:spcAft>
+                <a:spcPts val="600"/>
+              </a:spcAft>
+              <a:buClrTx/>
+              <a:buChar char="»"/>
+              <a:defRPr sz="1600">
+                <a:solidFill>
+                  <a:schemeClr val="tx1"/>
+                </a:solidFill>
+                <a:latin typeface="+mn-lt"/>
+              </a:defRPr>
+            </a:lvl5pPr>
+            <a:lvl6pPr marL="2438400" indent="-228600" algn="l" rtl="0" fontAlgn="base">
+              <a:spcBef>
+                <a:spcPct val="20000"/>
+              </a:spcBef>
+              <a:spcAft>
+                <a:spcPct val="0"/>
+              </a:spcAft>
+              <a:defRPr sz="1600">
+                <a:solidFill>
+                  <a:srgbClr val="006C30"/>
+                </a:solidFill>
+                <a:latin typeface="+mn-lt"/>
+              </a:defRPr>
+            </a:lvl6pPr>
+            <a:lvl7pPr marL="2895600" indent="-228600" algn="l" rtl="0" fontAlgn="base">
+              <a:spcBef>
+                <a:spcPct val="20000"/>
+              </a:spcBef>
+              <a:spcAft>
+                <a:spcPct val="0"/>
+              </a:spcAft>
+              <a:defRPr sz="1600">
+                <a:solidFill>
+                  <a:srgbClr val="006C30"/>
+                </a:solidFill>
+                <a:latin typeface="+mn-lt"/>
+              </a:defRPr>
+            </a:lvl7pPr>
+            <a:lvl8pPr marL="3352800" indent="-228600" algn="l" rtl="0" fontAlgn="base">
+              <a:spcBef>
+                <a:spcPct val="20000"/>
+              </a:spcBef>
+              <a:spcAft>
+                <a:spcPct val="0"/>
+              </a:spcAft>
+              <a:defRPr sz="1600">
+                <a:solidFill>
+                  <a:srgbClr val="006C30"/>
+                </a:solidFill>
+                <a:latin typeface="+mn-lt"/>
+              </a:defRPr>
+            </a:lvl8pPr>
+            <a:lvl9pPr marL="3810000" indent="-228600" algn="l" rtl="0" fontAlgn="base">
+              <a:spcBef>
+                <a:spcPct val="20000"/>
+              </a:spcBef>
+              <a:spcAft>
+                <a:spcPct val="0"/>
+              </a:spcAft>
+              <a:defRPr sz="1600">
+                <a:solidFill>
+                  <a:srgbClr val="006C30"/>
+                </a:solidFill>
+                <a:latin typeface="+mn-lt"/>
+              </a:defRPr>
+            </a:lvl9pPr>
+          </a:lstStyle>
+          <a:p>
+            <a:pPr marL="0" indent="0">
+              <a:buNone/>
+            </a:pPr>
+            <a:r>
+              <a:rPr lang="de-DE" sz="4800" b="1" dirty="0"/>
+              <a:t>Auszug aus dem Reanalyse Datensatz</a:t>
+            </a:r>
+            <a:endParaRPr lang="en-GB" sz="4800" b="1" dirty="0"/>
+          </a:p>
+          <a:p>
+            <a:pPr marL="0" indent="0">
+              <a:buNone/>
+            </a:pPr>
+            <a:endParaRPr lang="en-GB" kern="0" dirty="0"/>
+          </a:p>
+        </p:txBody>
+      </p:sp>
+      <p:pic>
+        <p:nvPicPr>
+          <p:cNvPr id="25" name="Inhaltsplatzhalter 24" descr="Ein Bild, das Tisch enthält.&#10;&#10;Automatisch generierte Beschreibung">
+            <a:extLst>
+              <a:ext uri="{FF2B5EF4-FFF2-40B4-BE49-F238E27FC236}">
+                <a16:creationId xmlns:a16="http://schemas.microsoft.com/office/drawing/2014/main" id="{8C9F5E97-B0E3-4EBC-BFE3-B31EBDDC0E32}"/>
+              </a:ext>
+            </a:extLst>
+          </p:cNvPr>
+          <p:cNvPicPr>
+            <a:picLocks noGrp="1" noChangeAspect="1"/>
+          </p:cNvPicPr>
+          <p:nvPr>
+            <p:ph idx="1"/>
+          </p:nvPr>
+        </p:nvPicPr>
+        <p:blipFill>
+          <a:blip r:embed="rId2">
+            <a:extLst>
+              <a:ext uri="{28A0092B-C50C-407E-A947-70E740481C1C}">
+                <a14:useLocalDpi xmlns:a14="http://schemas.microsoft.com/office/drawing/2010/main" val="0"/>
+              </a:ext>
+            </a:extLst>
+          </a:blip>
+          <a:stretch>
+            <a:fillRect/>
+          </a:stretch>
+        </p:blipFill>
+        <p:spPr>
+          <a:xfrm>
+            <a:off x="501217" y="2385316"/>
+            <a:ext cx="5990827" cy="1572305"/>
+          </a:xfrm>
+        </p:spPr>
+      </p:pic>
+      <p:pic>
+        <p:nvPicPr>
+          <p:cNvPr id="27" name="Grafik 26" descr="Ein Bild, das Tisch enthält.&#10;&#10;Automatisch generierte Beschreibung">
+            <a:extLst>
+              <a:ext uri="{FF2B5EF4-FFF2-40B4-BE49-F238E27FC236}">
+                <a16:creationId xmlns:a16="http://schemas.microsoft.com/office/drawing/2014/main" id="{C0619729-9CAB-47E1-AEC6-2D0F959B0C64}"/>
+              </a:ext>
+            </a:extLst>
+          </p:cNvPr>
+          <p:cNvPicPr>
+            <a:picLocks noChangeAspect="1"/>
+          </p:cNvPicPr>
+          <p:nvPr/>
+        </p:nvPicPr>
+        <p:blipFill>
+          <a:blip r:embed="rId3">
+            <a:extLst>
+              <a:ext uri="{28A0092B-C50C-407E-A947-70E740481C1C}">
+                <a14:useLocalDpi xmlns:a14="http://schemas.microsoft.com/office/drawing/2010/main" val="0"/>
+              </a:ext>
+            </a:extLst>
+          </a:blip>
+          <a:stretch>
+            <a:fillRect/>
+          </a:stretch>
+        </p:blipFill>
+        <p:spPr>
+          <a:xfrm>
+            <a:off x="501217" y="4269590"/>
+            <a:ext cx="6040983" cy="599569"/>
+          </a:xfrm>
+          <a:prstGeom prst="rect">
+            <a:avLst/>
+          </a:prstGeom>
+        </p:spPr>
+      </p:pic>
+      <p:pic>
+        <p:nvPicPr>
+          <p:cNvPr id="29" name="Grafik 28" descr="Ein Bild, das Tisch enthält.&#10;&#10;Automatisch generierte Beschreibung">
+            <a:extLst>
+              <a:ext uri="{FF2B5EF4-FFF2-40B4-BE49-F238E27FC236}">
+                <a16:creationId xmlns:a16="http://schemas.microsoft.com/office/drawing/2014/main" id="{D02872A1-6D46-428E-AA96-A1D60E77D673}"/>
+              </a:ext>
+            </a:extLst>
+          </p:cNvPr>
+          <p:cNvPicPr>
+            <a:picLocks noChangeAspect="1"/>
+          </p:cNvPicPr>
+          <p:nvPr/>
+        </p:nvPicPr>
+        <p:blipFill>
+          <a:blip r:embed="rId4">
+            <a:extLst>
+              <a:ext uri="{28A0092B-C50C-407E-A947-70E740481C1C}">
+                <a14:useLocalDpi xmlns:a14="http://schemas.microsoft.com/office/drawing/2010/main" val="0"/>
+              </a:ext>
+            </a:extLst>
+          </a:blip>
+          <a:stretch>
+            <a:fillRect/>
+          </a:stretch>
+        </p:blipFill>
+        <p:spPr>
+          <a:xfrm>
+            <a:off x="454497" y="5373216"/>
+            <a:ext cx="6034199" cy="599569"/>
+          </a:xfrm>
+          <a:prstGeom prst="rect">
+            <a:avLst/>
+          </a:prstGeom>
+        </p:spPr>
+      </p:pic>
+      <p:sp>
+        <p:nvSpPr>
+          <p:cNvPr id="30" name="Textfeld 29">
+            <a:extLst>
+              <a:ext uri="{FF2B5EF4-FFF2-40B4-BE49-F238E27FC236}">
+                <a16:creationId xmlns:a16="http://schemas.microsoft.com/office/drawing/2014/main" id="{69980E07-39B1-418F-BC41-443C1C799B2F}"/>
+              </a:ext>
+            </a:extLst>
+          </p:cNvPr>
+          <p:cNvSpPr txBox="1"/>
+          <p:nvPr/>
+        </p:nvSpPr>
+        <p:spPr>
+          <a:xfrm>
+            <a:off x="3293360" y="3806554"/>
+            <a:ext cx="607859" cy="400110"/>
+          </a:xfrm>
+          <a:prstGeom prst="rect">
+            <a:avLst/>
+          </a:prstGeom>
+          <a:noFill/>
+        </p:spPr>
+        <p:txBody>
+          <a:bodyPr wrap="none" rtlCol="0">
+            <a:spAutoFit/>
+          </a:bodyPr>
+          <a:lstStyle/>
+          <a:p>
+            <a:r>
+              <a:rPr lang="de-DE" sz="2000" dirty="0"/>
+              <a:t>.  .  .</a:t>
+            </a:r>
+          </a:p>
+        </p:txBody>
+      </p:sp>
+      <p:sp>
+        <p:nvSpPr>
+          <p:cNvPr id="31" name="Rechteck 30">
+            <a:extLst>
+              <a:ext uri="{FF2B5EF4-FFF2-40B4-BE49-F238E27FC236}">
+                <a16:creationId xmlns:a16="http://schemas.microsoft.com/office/drawing/2014/main" id="{D5AA273B-CA76-40D9-B49F-4C5AC81AE6D2}"/>
+              </a:ext>
+            </a:extLst>
+          </p:cNvPr>
+          <p:cNvSpPr/>
+          <p:nvPr/>
+        </p:nvSpPr>
+        <p:spPr>
+          <a:xfrm>
+            <a:off x="3293361" y="4864745"/>
+            <a:ext cx="607859" cy="400110"/>
+          </a:xfrm>
+          <a:prstGeom prst="rect">
+            <a:avLst/>
+          </a:prstGeom>
+        </p:spPr>
+        <p:txBody>
+          <a:bodyPr wrap="none">
+            <a:spAutoFit/>
+          </a:bodyPr>
+          <a:lstStyle/>
+          <a:p>
+            <a:r>
+              <a:rPr lang="de-DE" sz="2000" dirty="0"/>
+              <a:t>.  .  .</a:t>
+            </a:r>
+          </a:p>
+        </p:txBody>
+      </p:sp>
     </p:spTree>
     <p:extLst>
       <p:ext uri="{BB962C8B-B14F-4D97-AF65-F5344CB8AC3E}">
-        <p14:creationId xmlns:p14="http://schemas.microsoft.com/office/powerpoint/2010/main" val="91214873"/>
+        <p14:creationId xmlns:p14="http://schemas.microsoft.com/office/powerpoint/2010/main" val="4188469799"/>
       </p:ext>
     </p:extLst>
   </p:cSld>
@@ -3803,24 +7037,27 @@
             </a:pPr>
             <a:r>
               <a:rPr lang="de-DE" dirty="0"/>
-              <a:t>Datensatz filtern: wie das gemacht wurde </a:t>
+              <a:t>Datensatz Reanalyse erklären (8x 20 Messungen, Bereich zeigen auf Weltkarte wo die Messungen sind, </a:t>
             </a:r>
             <a:r>
               <a:rPr lang="de-DE" dirty="0" err="1"/>
-              <a:t>bzw</a:t>
+              <a:t>mslp</a:t>
             </a:r>
             <a:r>
               <a:rPr lang="de-DE" dirty="0"/>
-              <a:t> welche Variablen über bleiben und Clusterversuch, </a:t>
+              <a:t> und geopotential vorstellen (Wertebereich, Mittelwert etc.), täglich 4 Messungen, deshalb erstmal zusammengefasst zu </a:t>
             </a:r>
             <a:r>
               <a:rPr lang="de-DE" dirty="0" err="1"/>
-              <a:t>evtl</a:t>
-            </a:r>
-            <a:r>
-              <a:rPr lang="de-DE" dirty="0"/>
-              <a:t> auch Mosaikplot</a:t>
-            </a:r>
+              <a:t>avg</a:t>
+            </a:r>
+            <a:endParaRPr lang="de-DE" dirty="0"/>
+          </a:p>
+          <a:p>
+            <a:pPr marL="0" indent="0">
+              <a:buNone/>
+            </a:pPr>
+            <a:endParaRPr lang="de-DE" dirty="0"/>
           </a:p>
         </p:txBody>
       </p:sp>
@@ -4054,7 +7291,7 @@
     </p:spTree>
     <p:extLst>
       <p:ext uri="{BB962C8B-B14F-4D97-AF65-F5344CB8AC3E}">
-        <p14:creationId xmlns:p14="http://schemas.microsoft.com/office/powerpoint/2010/main" val="2394635770"/>
+        <p14:creationId xmlns:p14="http://schemas.microsoft.com/office/powerpoint/2010/main" val="2496986549"/>
       </p:ext>
     </p:extLst>
   </p:cSld>
@@ -4084,36 +7321,6 @@
       </p:grpSpPr>
       <p:sp>
         <p:nvSpPr>
-          <p:cNvPr id="3" name="Inhaltsplatzhalter 2"/>
-          <p:cNvSpPr>
-            <a:spLocks noGrp="1"/>
-          </p:cNvSpPr>
-          <p:nvPr>
-            <p:ph idx="1"/>
-          </p:nvPr>
-        </p:nvSpPr>
-        <p:spPr>
-          <a:xfrm>
-            <a:off x="302605" y="1347759"/>
-            <a:ext cx="11554963" cy="1505177"/>
-          </a:xfrm>
-        </p:spPr>
-        <p:txBody>
-          <a:bodyPr/>
-          <a:lstStyle/>
-          <a:p>
-            <a:pPr marL="0" indent="0">
-              <a:buNone/>
-            </a:pPr>
-            <a:r>
-              <a:rPr lang="de-DE" dirty="0"/>
-              <a:t>Etc.</a:t>
-            </a:r>
-          </a:p>
-        </p:txBody>
-      </p:sp>
-      <p:sp>
-        <p:nvSpPr>
           <p:cNvPr id="4" name="Foliennummernplatzhalter 3"/>
           <p:cNvSpPr>
             <a:spLocks noGrp="1"/>
@@ -4339,10 +7546,251 @@
           </a:p>
         </p:txBody>
       </p:sp>
+      <p:sp>
+        <p:nvSpPr>
+          <p:cNvPr id="10" name="Inhaltsplatzhalter 5">
+            <a:extLst>
+              <a:ext uri="{FF2B5EF4-FFF2-40B4-BE49-F238E27FC236}">
+                <a16:creationId xmlns:a16="http://schemas.microsoft.com/office/drawing/2014/main" id="{A5ACB287-AAF7-490C-B404-B677804C2208}"/>
+              </a:ext>
+            </a:extLst>
+          </p:cNvPr>
+          <p:cNvSpPr txBox="1">
+            <a:spLocks/>
+          </p:cNvSpPr>
+          <p:nvPr/>
+        </p:nvSpPr>
+        <p:spPr bwMode="auto">
+          <a:xfrm>
+            <a:off x="155340" y="1528834"/>
+            <a:ext cx="11554963" cy="3816424"/>
+          </a:xfrm>
+          <a:prstGeom prst="rect">
+            <a:avLst/>
+          </a:prstGeom>
+          <a:noFill/>
+          <a:ln w="9525">
+            <a:noFill/>
+            <a:miter lim="800000"/>
+            <a:headEnd/>
+            <a:tailEnd/>
+          </a:ln>
+        </p:spPr>
+        <p:txBody>
+          <a:bodyPr vert="horz" wrap="square" lIns="91440" tIns="45720" rIns="91440" bIns="45720" numCol="1" anchor="t" anchorCtr="0" compatLnSpc="1">
+            <a:prstTxWarp prst="textNoShape">
+              <a:avLst/>
+            </a:prstTxWarp>
+          </a:bodyPr>
+          <a:lstStyle>
+            <a:lvl1pPr marL="342900" indent="-342900" algn="l" rtl="0" eaLnBrk="0" fontAlgn="base" hangingPunct="0">
+              <a:lnSpc>
+                <a:spcPct val="100000"/>
+              </a:lnSpc>
+              <a:spcBef>
+                <a:spcPts val="0"/>
+              </a:spcBef>
+              <a:spcAft>
+                <a:spcPts val="600"/>
+              </a:spcAft>
+              <a:buClrTx/>
+              <a:buChar char="•"/>
+              <a:defRPr sz="2400">
+                <a:solidFill>
+                  <a:schemeClr val="tx1"/>
+                </a:solidFill>
+                <a:latin typeface="+mn-lt"/>
+                <a:ea typeface="+mn-ea"/>
+                <a:cs typeface="+mn-cs"/>
+              </a:defRPr>
+            </a:lvl1pPr>
+            <a:lvl2pPr marL="742950" indent="-285750" algn="l" rtl="0" eaLnBrk="0" fontAlgn="base" hangingPunct="0">
+              <a:lnSpc>
+                <a:spcPct val="100000"/>
+              </a:lnSpc>
+              <a:spcBef>
+                <a:spcPts val="0"/>
+              </a:spcBef>
+              <a:spcAft>
+                <a:spcPts val="600"/>
+              </a:spcAft>
+              <a:buClrTx/>
+              <a:buFont typeface="Times" pitchFamily="18" charset="0"/>
+              <a:buChar char="•"/>
+              <a:defRPr sz="1600">
+                <a:solidFill>
+                  <a:schemeClr val="tx1"/>
+                </a:solidFill>
+                <a:latin typeface="+mn-lt"/>
+              </a:defRPr>
+            </a:lvl2pPr>
+            <a:lvl3pPr marL="1143000" indent="-228600" algn="l" rtl="0" eaLnBrk="0" fontAlgn="base" hangingPunct="0">
+              <a:lnSpc>
+                <a:spcPct val="100000"/>
+              </a:lnSpc>
+              <a:spcBef>
+                <a:spcPts val="0"/>
+              </a:spcBef>
+              <a:spcAft>
+                <a:spcPts val="600"/>
+              </a:spcAft>
+              <a:buClrTx/>
+              <a:buFont typeface="LMU CompatilFact" pitchFamily="2" charset="0"/>
+              <a:buChar char="–"/>
+              <a:defRPr sz="1600">
+                <a:solidFill>
+                  <a:schemeClr val="tx1"/>
+                </a:solidFill>
+                <a:latin typeface="+mn-lt"/>
+              </a:defRPr>
+            </a:lvl3pPr>
+            <a:lvl4pPr marL="1562100" indent="-228600" algn="l" rtl="0" eaLnBrk="0" fontAlgn="base" hangingPunct="0">
+              <a:lnSpc>
+                <a:spcPct val="100000"/>
+              </a:lnSpc>
+              <a:spcBef>
+                <a:spcPts val="0"/>
+              </a:spcBef>
+              <a:spcAft>
+                <a:spcPts val="600"/>
+              </a:spcAft>
+              <a:buClrTx/>
+              <a:buChar char="-"/>
+              <a:defRPr sz="1600">
+                <a:solidFill>
+                  <a:schemeClr val="tx1"/>
+                </a:solidFill>
+                <a:latin typeface="+mn-lt"/>
+              </a:defRPr>
+            </a:lvl4pPr>
+            <a:lvl5pPr marL="1981200" indent="-228600" algn="l" rtl="0" eaLnBrk="0" fontAlgn="base" hangingPunct="0">
+              <a:lnSpc>
+                <a:spcPct val="100000"/>
+              </a:lnSpc>
+              <a:spcBef>
+                <a:spcPts val="0"/>
+              </a:spcBef>
+              <a:spcAft>
+                <a:spcPts val="600"/>
+              </a:spcAft>
+              <a:buClrTx/>
+              <a:buChar char="»"/>
+              <a:defRPr sz="1600">
+                <a:solidFill>
+                  <a:schemeClr val="tx1"/>
+                </a:solidFill>
+                <a:latin typeface="+mn-lt"/>
+              </a:defRPr>
+            </a:lvl5pPr>
+            <a:lvl6pPr marL="2438400" indent="-228600" algn="l" rtl="0" fontAlgn="base">
+              <a:spcBef>
+                <a:spcPct val="20000"/>
+              </a:spcBef>
+              <a:spcAft>
+                <a:spcPct val="0"/>
+              </a:spcAft>
+              <a:defRPr sz="1600">
+                <a:solidFill>
+                  <a:srgbClr val="006C30"/>
+                </a:solidFill>
+                <a:latin typeface="+mn-lt"/>
+              </a:defRPr>
+            </a:lvl6pPr>
+            <a:lvl7pPr marL="2895600" indent="-228600" algn="l" rtl="0" fontAlgn="base">
+              <a:spcBef>
+                <a:spcPct val="20000"/>
+              </a:spcBef>
+              <a:spcAft>
+                <a:spcPct val="0"/>
+              </a:spcAft>
+              <a:defRPr sz="1600">
+                <a:solidFill>
+                  <a:srgbClr val="006C30"/>
+                </a:solidFill>
+                <a:latin typeface="+mn-lt"/>
+              </a:defRPr>
+            </a:lvl7pPr>
+            <a:lvl8pPr marL="3352800" indent="-228600" algn="l" rtl="0" fontAlgn="base">
+              <a:spcBef>
+                <a:spcPct val="20000"/>
+              </a:spcBef>
+              <a:spcAft>
+                <a:spcPct val="0"/>
+              </a:spcAft>
+              <a:defRPr sz="1600">
+                <a:solidFill>
+                  <a:srgbClr val="006C30"/>
+                </a:solidFill>
+                <a:latin typeface="+mn-lt"/>
+              </a:defRPr>
+            </a:lvl8pPr>
+            <a:lvl9pPr marL="3810000" indent="-228600" algn="l" rtl="0" fontAlgn="base">
+              <a:spcBef>
+                <a:spcPct val="20000"/>
+              </a:spcBef>
+              <a:spcAft>
+                <a:spcPct val="0"/>
+              </a:spcAft>
+              <a:defRPr sz="1600">
+                <a:solidFill>
+                  <a:srgbClr val="006C30"/>
+                </a:solidFill>
+                <a:latin typeface="+mn-lt"/>
+              </a:defRPr>
+            </a:lvl9pPr>
+          </a:lstStyle>
+          <a:p>
+            <a:pPr marL="914400" indent="-914400">
+              <a:buAutoNum type="arabicPeriod" startAt="2"/>
+            </a:pPr>
+            <a:r>
+              <a:rPr lang="de-DE" sz="4800" b="1" kern="0" dirty="0"/>
+              <a:t>Einführung in Cluster</a:t>
+            </a:r>
+          </a:p>
+          <a:p>
+            <a:r>
+              <a:rPr lang="de-DE" sz="2800" dirty="0"/>
+              <a:t>Grundidee: Bildung von möglichst homogenen Gruppen, Cluster untereinander möglichst heterogen</a:t>
+            </a:r>
+          </a:p>
+          <a:p>
+            <a:r>
+              <a:rPr lang="de-DE" sz="2800" kern="0" dirty="0"/>
+              <a:t>Hierarchisches Clustering: …</a:t>
+            </a:r>
+          </a:p>
+          <a:p>
+            <a:r>
+              <a:rPr lang="de-DE" sz="2800" kern="0" dirty="0"/>
+              <a:t>Partitioniertes Clustering: …</a:t>
+            </a:r>
+          </a:p>
+          <a:p>
+            <a:r>
+              <a:rPr lang="de-DE" sz="2800" kern="0" dirty="0"/>
+              <a:t>Distanzmatrix etc.</a:t>
+            </a:r>
+          </a:p>
+          <a:p>
+            <a:pPr marL="0" indent="0">
+              <a:buFontTx/>
+              <a:buNone/>
+            </a:pPr>
+            <a:endParaRPr lang="de-DE" sz="900" b="1" kern="0" dirty="0"/>
+          </a:p>
+          <a:p>
+            <a:pPr marL="0" indent="0">
+              <a:buNone/>
+            </a:pPr>
+            <a:endParaRPr lang="de-DE" sz="2800" kern="0" dirty="0"/>
+          </a:p>
+        </p:txBody>
+      </p:sp>
     </p:spTree>
     <p:extLst>
       <p:ext uri="{BB962C8B-B14F-4D97-AF65-F5344CB8AC3E}">
-        <p14:creationId xmlns:p14="http://schemas.microsoft.com/office/powerpoint/2010/main" val="3258005233"/>
+        <p14:creationId xmlns:p14="http://schemas.microsoft.com/office/powerpoint/2010/main" val="4265196740"/>
       </p:ext>
     </p:extLst>
   </p:cSld>
@@ -4393,7 +7841,10 @@
             <a:pPr marL="0" indent="0">
               <a:buNone/>
             </a:pPr>
-            <a:endParaRPr lang="de-DE" dirty="0"/>
+            <a:r>
+              <a:rPr lang="de-DE" dirty="0"/>
+              <a:t>Cluster Versuch mit 320 Dimensionen </a:t>
+            </a:r>
           </a:p>
         </p:txBody>
       </p:sp>
@@ -4627,7 +8078,7 @@
     </p:spTree>
     <p:extLst>
       <p:ext uri="{BB962C8B-B14F-4D97-AF65-F5344CB8AC3E}">
-        <p14:creationId xmlns:p14="http://schemas.microsoft.com/office/powerpoint/2010/main" val="1592585429"/>
+        <p14:creationId xmlns:p14="http://schemas.microsoft.com/office/powerpoint/2010/main" val="3950738348"/>
       </p:ext>
     </p:extLst>
   </p:cSld>

</xml_diff>